<commit_message>
revise Android 10 3rd party app investigation
</commit_message>
<xml_diff>
--- a/Android10/5_1_3_AOSP_App_Investigations_Calendar.pptx
+++ b/Android10/5_1_3_AOSP_App_Investigations_Calendar.pptx
@@ -5,26 +5,27 @@
     <p:sldMasterId id="2147483648" r:id="rId1"/>
   </p:sldMasterIdLst>
   <p:notesMasterIdLst>
-    <p:notesMasterId r:id="rId19"/>
+    <p:notesMasterId r:id="rId20"/>
   </p:notesMasterIdLst>
   <p:sldIdLst>
     <p:sldId id="256" r:id="rId2"/>
-    <p:sldId id="408" r:id="rId3"/>
-    <p:sldId id="451" r:id="rId4"/>
-    <p:sldId id="457" r:id="rId5"/>
-    <p:sldId id="448" r:id="rId6"/>
-    <p:sldId id="497" r:id="rId7"/>
-    <p:sldId id="410" r:id="rId8"/>
-    <p:sldId id="411" r:id="rId9"/>
-    <p:sldId id="412" r:id="rId10"/>
-    <p:sldId id="498" r:id="rId11"/>
-    <p:sldId id="499" r:id="rId12"/>
-    <p:sldId id="500" r:id="rId13"/>
-    <p:sldId id="501" r:id="rId14"/>
-    <p:sldId id="502" r:id="rId15"/>
-    <p:sldId id="503" r:id="rId16"/>
-    <p:sldId id="449" r:id="rId17"/>
-    <p:sldId id="413" r:id="rId18"/>
+    <p:sldId id="504" r:id="rId3"/>
+    <p:sldId id="408" r:id="rId4"/>
+    <p:sldId id="451" r:id="rId5"/>
+    <p:sldId id="457" r:id="rId6"/>
+    <p:sldId id="448" r:id="rId7"/>
+    <p:sldId id="505" r:id="rId8"/>
+    <p:sldId id="497" r:id="rId9"/>
+    <p:sldId id="410" r:id="rId10"/>
+    <p:sldId id="411" r:id="rId11"/>
+    <p:sldId id="412" r:id="rId12"/>
+    <p:sldId id="498" r:id="rId13"/>
+    <p:sldId id="499" r:id="rId14"/>
+    <p:sldId id="500" r:id="rId15"/>
+    <p:sldId id="501" r:id="rId16"/>
+    <p:sldId id="502" r:id="rId17"/>
+    <p:sldId id="503" r:id="rId18"/>
+    <p:sldId id="449" r:id="rId19"/>
   </p:sldIdLst>
   <p:sldSz cx="12192000" cy="6858000"/>
   <p:notesSz cx="6858000" cy="9144000"/>
@@ -146,7 +147,7 @@
 <file path=ppt/revisionInfo.xml><?xml version="1.0" encoding="utf-8"?>
 <p1510:revInfo xmlns:a="http://schemas.openxmlformats.org/drawingml/2006/main" xmlns:r="http://schemas.openxmlformats.org/officeDocument/2006/relationships" xmlns:p1510="http://schemas.microsoft.com/office/powerpoint/2015/10/main">
   <p1510:revLst>
-    <p1510:client id="{519CFF70-A104-4BE5-B7AF-E221F0BC4D16}" v="3" dt="2025-04-03T12:07:28.701"/>
+    <p1510:client id="{519CFF70-A104-4BE5-B7AF-E221F0BC4D16}" v="4" dt="2025-04-07T17:17:21.523"/>
   </p1510:revLst>
 </p1510:revInfo>
 </file>
@@ -4481,7 +4482,7 @@
   <pc:docChgLst>
     <pc:chgData name="Weifeng Xu" userId="e7aed605-a3dd-4d5a-a692-a87037af107b" providerId="ADAL" clId="{519CFF70-A104-4BE5-B7AF-E221F0BC4D16}"/>
     <pc:docChg chg="undo custSel addSld delSld modSld">
-      <pc:chgData name="Weifeng Xu" userId="e7aed605-a3dd-4d5a-a692-a87037af107b" providerId="ADAL" clId="{519CFF70-A104-4BE5-B7AF-E221F0BC4D16}" dt="2025-04-03T12:21:46.824" v="243" actId="1076"/>
+      <pc:chgData name="Weifeng Xu" userId="e7aed605-a3dd-4d5a-a692-a87037af107b" providerId="ADAL" clId="{519CFF70-A104-4BE5-B7AF-E221F0BC4D16}" dt="2025-04-07T17:22:03.229" v="443" actId="47"/>
       <pc:docMkLst>
         <pc:docMk/>
       </pc:docMkLst>
@@ -4614,11 +4615,19 @@
         </pc:sldMkLst>
       </pc:sldChg>
       <pc:sldChg chg="modSp mod">
-        <pc:chgData name="Weifeng Xu" userId="e7aed605-a3dd-4d5a-a692-a87037af107b" providerId="ADAL" clId="{519CFF70-A104-4BE5-B7AF-E221F0BC4D16}" dt="2021-08-09T01:41:56.789" v="153" actId="6549"/>
+        <pc:chgData name="Weifeng Xu" userId="e7aed605-a3dd-4d5a-a692-a87037af107b" providerId="ADAL" clId="{519CFF70-A104-4BE5-B7AF-E221F0BC4D16}" dt="2025-04-07T17:14:42.311" v="250" actId="207"/>
         <pc:sldMkLst>
           <pc:docMk/>
           <pc:sldMk cId="2622453785" sldId="408"/>
         </pc:sldMkLst>
+        <pc:spChg chg="mod">
+          <ac:chgData name="Weifeng Xu" userId="e7aed605-a3dd-4d5a-a692-a87037af107b" providerId="ADAL" clId="{519CFF70-A104-4BE5-B7AF-E221F0BC4D16}" dt="2025-04-07T17:14:42.311" v="250" actId="207"/>
+          <ac:spMkLst>
+            <pc:docMk/>
+            <pc:sldMk cId="2622453785" sldId="408"/>
+            <ac:spMk id="3" creationId="{9E0091E6-6379-4EE0-84A0-9638938021AE}"/>
+          </ac:spMkLst>
+        </pc:spChg>
       </pc:sldChg>
       <pc:sldChg chg="add del">
         <pc:chgData name="Weifeng Xu" userId="e7aed605-a3dd-4d5a-a692-a87037af107b" providerId="ADAL" clId="{519CFF70-A104-4BE5-B7AF-E221F0BC4D16}" dt="2021-08-09T01:43:42.601" v="159" actId="47"/>
@@ -4628,25 +4637,65 @@
         </pc:sldMkLst>
       </pc:sldChg>
       <pc:sldChg chg="delSp modSp mod">
-        <pc:chgData name="Weifeng Xu" userId="e7aed605-a3dd-4d5a-a692-a87037af107b" providerId="ADAL" clId="{519CFF70-A104-4BE5-B7AF-E221F0BC4D16}" dt="2021-08-09T01:45:15.136" v="166" actId="478"/>
+        <pc:chgData name="Weifeng Xu" userId="e7aed605-a3dd-4d5a-a692-a87037af107b" providerId="ADAL" clId="{519CFF70-A104-4BE5-B7AF-E221F0BC4D16}" dt="2025-04-07T17:19:23.173" v="396" actId="20577"/>
         <pc:sldMkLst>
           <pc:docMk/>
           <pc:sldMk cId="1839150834" sldId="410"/>
         </pc:sldMkLst>
+        <pc:spChg chg="mod">
+          <ac:chgData name="Weifeng Xu" userId="e7aed605-a3dd-4d5a-a692-a87037af107b" providerId="ADAL" clId="{519CFF70-A104-4BE5-B7AF-E221F0BC4D16}" dt="2025-04-07T17:19:23.173" v="396" actId="20577"/>
+          <ac:spMkLst>
+            <pc:docMk/>
+            <pc:sldMk cId="1839150834" sldId="410"/>
+            <ac:spMk id="2" creationId="{D3B4A165-01E0-49B9-A70C-492D7951A6C6}"/>
+          </ac:spMkLst>
+        </pc:spChg>
       </pc:sldChg>
       <pc:sldChg chg="addSp delSp modSp mod">
-        <pc:chgData name="Weifeng Xu" userId="e7aed605-a3dd-4d5a-a692-a87037af107b" providerId="ADAL" clId="{519CFF70-A104-4BE5-B7AF-E221F0BC4D16}" dt="2021-08-09T01:45:33.807" v="173" actId="478"/>
+        <pc:chgData name="Weifeng Xu" userId="e7aed605-a3dd-4d5a-a692-a87037af107b" providerId="ADAL" clId="{519CFF70-A104-4BE5-B7AF-E221F0BC4D16}" dt="2025-04-07T17:20:15.783" v="432" actId="207"/>
         <pc:sldMkLst>
           <pc:docMk/>
           <pc:sldMk cId="46822973" sldId="411"/>
         </pc:sldMkLst>
+        <pc:spChg chg="mod">
+          <ac:chgData name="Weifeng Xu" userId="e7aed605-a3dd-4d5a-a692-a87037af107b" providerId="ADAL" clId="{519CFF70-A104-4BE5-B7AF-E221F0BC4D16}" dt="2025-04-07T17:20:15.783" v="432" actId="207"/>
+          <ac:spMkLst>
+            <pc:docMk/>
+            <pc:sldMk cId="46822973" sldId="411"/>
+            <ac:spMk id="2" creationId="{88A96AAE-54C7-4A67-B297-1D11C1D82726}"/>
+          </ac:spMkLst>
+        </pc:spChg>
+        <pc:spChg chg="mod">
+          <ac:chgData name="Weifeng Xu" userId="e7aed605-a3dd-4d5a-a692-a87037af107b" providerId="ADAL" clId="{519CFF70-A104-4BE5-B7AF-E221F0BC4D16}" dt="2025-04-07T17:05:25.604" v="245" actId="14100"/>
+          <ac:spMkLst>
+            <pc:docMk/>
+            <pc:sldMk cId="46822973" sldId="411"/>
+            <ac:spMk id="6" creationId="{383E0541-0D55-451D-AAD3-ADD4C9225F75}"/>
+          </ac:spMkLst>
+        </pc:spChg>
+        <pc:picChg chg="mod">
+          <ac:chgData name="Weifeng Xu" userId="e7aed605-a3dd-4d5a-a692-a87037af107b" providerId="ADAL" clId="{519CFF70-A104-4BE5-B7AF-E221F0BC4D16}" dt="2025-04-07T17:05:21.920" v="244" actId="14100"/>
+          <ac:picMkLst>
+            <pc:docMk/>
+            <pc:sldMk cId="46822973" sldId="411"/>
+            <ac:picMk id="5" creationId="{8AEDF05A-60F2-4524-8451-C5C728E103BB}"/>
+          </ac:picMkLst>
+        </pc:picChg>
       </pc:sldChg>
       <pc:sldChg chg="delSp modSp mod">
-        <pc:chgData name="Weifeng Xu" userId="e7aed605-a3dd-4d5a-a692-a87037af107b" providerId="ADAL" clId="{519CFF70-A104-4BE5-B7AF-E221F0BC4D16}" dt="2025-04-03T12:00:41.720" v="185" actId="6549"/>
+        <pc:chgData name="Weifeng Xu" userId="e7aed605-a3dd-4d5a-a692-a87037af107b" providerId="ADAL" clId="{519CFF70-A104-4BE5-B7AF-E221F0BC4D16}" dt="2025-04-07T17:20:28.916" v="433"/>
         <pc:sldMkLst>
           <pc:docMk/>
           <pc:sldMk cId="3735861723" sldId="412"/>
         </pc:sldMkLst>
+        <pc:spChg chg="mod">
+          <ac:chgData name="Weifeng Xu" userId="e7aed605-a3dd-4d5a-a692-a87037af107b" providerId="ADAL" clId="{519CFF70-A104-4BE5-B7AF-E221F0BC4D16}" dt="2025-04-07T17:20:28.916" v="433"/>
+          <ac:spMkLst>
+            <pc:docMk/>
+            <pc:sldMk cId="3735861723" sldId="412"/>
+            <ac:spMk id="2" creationId="{B23D5793-2D2E-4A05-BBDB-A78A693AE53B}"/>
+          </ac:spMkLst>
+        </pc:spChg>
         <pc:spChg chg="mod">
           <ac:chgData name="Weifeng Xu" userId="e7aed605-a3dd-4d5a-a692-a87037af107b" providerId="ADAL" clId="{519CFF70-A104-4BE5-B7AF-E221F0BC4D16}" dt="2025-04-03T12:00:41.720" v="185" actId="6549"/>
           <ac:spMkLst>
@@ -4657,6 +4706,13 @@
         </pc:spChg>
       </pc:sldChg>
       <pc:sldChg chg="del">
+        <pc:chgData name="Weifeng Xu" userId="e7aed605-a3dd-4d5a-a692-a87037af107b" providerId="ADAL" clId="{519CFF70-A104-4BE5-B7AF-E221F0BC4D16}" dt="2025-04-07T17:22:03.229" v="443" actId="47"/>
+        <pc:sldMkLst>
+          <pc:docMk/>
+          <pc:sldMk cId="3552793750" sldId="413"/>
+        </pc:sldMkLst>
+      </pc:sldChg>
+      <pc:sldChg chg="del">
         <pc:chgData name="Weifeng Xu" userId="e7aed605-a3dd-4d5a-a692-a87037af107b" providerId="ADAL" clId="{519CFF70-A104-4BE5-B7AF-E221F0BC4D16}" dt="2021-08-09T01:38:24.327" v="35" actId="47"/>
         <pc:sldMkLst>
           <pc:docMk/>
@@ -4781,6 +4837,44 @@
           <pc:docMk/>
           <pc:sldMk cId="2270913000" sldId="447"/>
         </pc:sldMkLst>
+      </pc:sldChg>
+      <pc:sldChg chg="modSp mod">
+        <pc:chgData name="Weifeng Xu" userId="e7aed605-a3dd-4d5a-a692-a87037af107b" providerId="ADAL" clId="{519CFF70-A104-4BE5-B7AF-E221F0BC4D16}" dt="2025-04-07T17:17:07.826" v="313" actId="14"/>
+        <pc:sldMkLst>
+          <pc:docMk/>
+          <pc:sldMk cId="2349952390" sldId="448"/>
+        </pc:sldMkLst>
+        <pc:spChg chg="mod">
+          <ac:chgData name="Weifeng Xu" userId="e7aed605-a3dd-4d5a-a692-a87037af107b" providerId="ADAL" clId="{519CFF70-A104-4BE5-B7AF-E221F0BC4D16}" dt="2025-04-07T17:17:03.225" v="312" actId="20577"/>
+          <ac:spMkLst>
+            <pc:docMk/>
+            <pc:sldMk cId="2349952390" sldId="448"/>
+            <ac:spMk id="2" creationId="{CF34116F-509B-4B9B-9679-ECC66D038AA9}"/>
+          </ac:spMkLst>
+        </pc:spChg>
+        <pc:spChg chg="mod">
+          <ac:chgData name="Weifeng Xu" userId="e7aed605-a3dd-4d5a-a692-a87037af107b" providerId="ADAL" clId="{519CFF70-A104-4BE5-B7AF-E221F0BC4D16}" dt="2025-04-07T17:17:07.826" v="313" actId="14"/>
+          <ac:spMkLst>
+            <pc:docMk/>
+            <pc:sldMk cId="2349952390" sldId="448"/>
+            <ac:spMk id="3" creationId="{C05CC460-5102-4C30-BFDF-57CA52235995}"/>
+          </ac:spMkLst>
+        </pc:spChg>
+      </pc:sldChg>
+      <pc:sldChg chg="modSp mod">
+        <pc:chgData name="Weifeng Xu" userId="e7aed605-a3dd-4d5a-a692-a87037af107b" providerId="ADAL" clId="{519CFF70-A104-4BE5-B7AF-E221F0BC4D16}" dt="2025-04-07T17:21:58.855" v="442" actId="20577"/>
+        <pc:sldMkLst>
+          <pc:docMk/>
+          <pc:sldMk cId="2217854660" sldId="449"/>
+        </pc:sldMkLst>
+        <pc:spChg chg="mod">
+          <ac:chgData name="Weifeng Xu" userId="e7aed605-a3dd-4d5a-a692-a87037af107b" providerId="ADAL" clId="{519CFF70-A104-4BE5-B7AF-E221F0BC4D16}" dt="2025-04-07T17:21:58.855" v="442" actId="20577"/>
+          <ac:spMkLst>
+            <pc:docMk/>
+            <pc:sldMk cId="2217854660" sldId="449"/>
+            <ac:spMk id="2" creationId="{096E0F7A-5AAA-4C3C-A435-A7F65049BF77}"/>
+          </ac:spMkLst>
+        </pc:spChg>
       </pc:sldChg>
       <pc:sldChg chg="modSp mod">
         <pc:chgData name="Weifeng Xu" userId="e7aed605-a3dd-4d5a-a692-a87037af107b" providerId="ADAL" clId="{519CFF70-A104-4BE5-B7AF-E221F0BC4D16}" dt="2021-08-09T01:42:12.191" v="154" actId="313"/>
@@ -5048,12 +5142,28 @@
           <pc:sldMk cId="3788700773" sldId="496"/>
         </pc:sldMkLst>
       </pc:sldChg>
-      <pc:sldChg chg="add del">
-        <pc:chgData name="Weifeng Xu" userId="e7aed605-a3dd-4d5a-a692-a87037af107b" providerId="ADAL" clId="{519CFF70-A104-4BE5-B7AF-E221F0BC4D16}" dt="2021-08-09T01:43:37.062" v="158" actId="47"/>
+      <pc:sldChg chg="modSp add del mod">
+        <pc:chgData name="Weifeng Xu" userId="e7aed605-a3dd-4d5a-a692-a87037af107b" providerId="ADAL" clId="{519CFF70-A104-4BE5-B7AF-E221F0BC4D16}" dt="2025-04-07T17:18:30.631" v="348" actId="12"/>
         <pc:sldMkLst>
           <pc:docMk/>
           <pc:sldMk cId="1156047588" sldId="497"/>
         </pc:sldMkLst>
+        <pc:spChg chg="mod">
+          <ac:chgData name="Weifeng Xu" userId="e7aed605-a3dd-4d5a-a692-a87037af107b" providerId="ADAL" clId="{519CFF70-A104-4BE5-B7AF-E221F0BC4D16}" dt="2025-04-07T17:18:07.706" v="346" actId="20577"/>
+          <ac:spMkLst>
+            <pc:docMk/>
+            <pc:sldMk cId="1156047588" sldId="497"/>
+            <ac:spMk id="6" creationId="{E2F856D4-F051-4999-93C1-1D83F8208F03}"/>
+          </ac:spMkLst>
+        </pc:spChg>
+        <pc:spChg chg="mod">
+          <ac:chgData name="Weifeng Xu" userId="e7aed605-a3dd-4d5a-a692-a87037af107b" providerId="ADAL" clId="{519CFF70-A104-4BE5-B7AF-E221F0BC4D16}" dt="2025-04-07T17:18:30.631" v="348" actId="12"/>
+          <ac:spMkLst>
+            <pc:docMk/>
+            <pc:sldMk cId="1156047588" sldId="497"/>
+            <ac:spMk id="7" creationId="{9FB82F0C-1384-4573-A52E-14FA3E8989B6}"/>
+          </ac:spMkLst>
+        </pc:spChg>
       </pc:sldChg>
       <pc:sldChg chg="del">
         <pc:chgData name="Weifeng Xu" userId="e7aed605-a3dd-4d5a-a692-a87037af107b" providerId="ADAL" clId="{519CFF70-A104-4BE5-B7AF-E221F0BC4D16}" dt="2021-08-09T01:38:42.312" v="74" actId="47"/>
@@ -5084,14 +5194,6 @@
             <ac:spMk id="3" creationId="{F3797446-CE3A-6998-089F-215632787412}"/>
           </ac:spMkLst>
         </pc:spChg>
-        <pc:spChg chg="add mod">
-          <ac:chgData name="Weifeng Xu" userId="e7aed605-a3dd-4d5a-a692-a87037af107b" providerId="ADAL" clId="{519CFF70-A104-4BE5-B7AF-E221F0BC4D16}" dt="2025-04-03T12:07:25.777" v="193"/>
-          <ac:spMkLst>
-            <pc:docMk/>
-            <pc:sldMk cId="2656319871" sldId="498"/>
-            <ac:spMk id="4" creationId="{64417D11-914D-627C-0EA8-D9578F671298}"/>
-          </ac:spMkLst>
-        </pc:spChg>
       </pc:sldChg>
       <pc:sldChg chg="del">
         <pc:chgData name="Weifeng Xu" userId="e7aed605-a3dd-4d5a-a692-a87037af107b" providerId="ADAL" clId="{519CFF70-A104-4BE5-B7AF-E221F0BC4D16}" dt="2021-08-09T01:38:41.819" v="73" actId="47"/>
@@ -5106,22 +5208,6 @@
           <pc:docMk/>
           <pc:sldMk cId="3154280878" sldId="499"/>
         </pc:sldMkLst>
-        <pc:spChg chg="del">
-          <ac:chgData name="Weifeng Xu" userId="e7aed605-a3dd-4d5a-a692-a87037af107b" providerId="ADAL" clId="{519CFF70-A104-4BE5-B7AF-E221F0BC4D16}" dt="2025-04-03T12:10:33.749" v="213" actId="700"/>
-          <ac:spMkLst>
-            <pc:docMk/>
-            <pc:sldMk cId="3154280878" sldId="499"/>
-            <ac:spMk id="2" creationId="{90F5D2FA-B376-34A6-16D6-45752B7C6131}"/>
-          </ac:spMkLst>
-        </pc:spChg>
-        <pc:spChg chg="del">
-          <ac:chgData name="Weifeng Xu" userId="e7aed605-a3dd-4d5a-a692-a87037af107b" providerId="ADAL" clId="{519CFF70-A104-4BE5-B7AF-E221F0BC4D16}" dt="2025-04-03T12:10:33.749" v="213" actId="700"/>
-          <ac:spMkLst>
-            <pc:docMk/>
-            <pc:sldMk cId="3154280878" sldId="499"/>
-            <ac:spMk id="3" creationId="{15BAA5E1-13F0-A0F3-B838-FAE5E4643576}"/>
-          </ac:spMkLst>
-        </pc:spChg>
         <pc:spChg chg="add mod">
           <ac:chgData name="Weifeng Xu" userId="e7aed605-a3dd-4d5a-a692-a87037af107b" providerId="ADAL" clId="{519CFF70-A104-4BE5-B7AF-E221F0BC4D16}" dt="2025-04-03T12:13:30.868" v="215"/>
           <ac:spMkLst>
@@ -5145,30 +5231,6 @@
           <pc:docMk/>
           <pc:sldMk cId="83335793" sldId="500"/>
         </pc:sldMkLst>
-        <pc:spChg chg="del">
-          <ac:chgData name="Weifeng Xu" userId="e7aed605-a3dd-4d5a-a692-a87037af107b" providerId="ADAL" clId="{519CFF70-A104-4BE5-B7AF-E221F0BC4D16}" dt="2025-04-03T12:14:36.417" v="220" actId="700"/>
-          <ac:spMkLst>
-            <pc:docMk/>
-            <pc:sldMk cId="83335793" sldId="500"/>
-            <ac:spMk id="2" creationId="{AF8E2A9E-4402-F91B-B9AD-B9F1FC25D941}"/>
-          </ac:spMkLst>
-        </pc:spChg>
-        <pc:spChg chg="del">
-          <ac:chgData name="Weifeng Xu" userId="e7aed605-a3dd-4d5a-a692-a87037af107b" providerId="ADAL" clId="{519CFF70-A104-4BE5-B7AF-E221F0BC4D16}" dt="2025-04-03T12:14:36.417" v="220" actId="700"/>
-          <ac:spMkLst>
-            <pc:docMk/>
-            <pc:sldMk cId="83335793" sldId="500"/>
-            <ac:spMk id="3" creationId="{0BCC4E1E-ABC4-1607-FFD0-55215C47F7BF}"/>
-          </ac:spMkLst>
-        </pc:spChg>
-        <pc:picChg chg="add del mod">
-          <ac:chgData name="Weifeng Xu" userId="e7aed605-a3dd-4d5a-a692-a87037af107b" providerId="ADAL" clId="{519CFF70-A104-4BE5-B7AF-E221F0BC4D16}" dt="2025-04-03T12:15:08.136" v="226" actId="22"/>
-          <ac:picMkLst>
-            <pc:docMk/>
-            <pc:sldMk cId="83335793" sldId="500"/>
-            <ac:picMk id="5" creationId="{7021775F-5325-4ED0-4BB9-A4938E5B545F}"/>
-          </ac:picMkLst>
-        </pc:picChg>
         <pc:picChg chg="add mod">
           <ac:chgData name="Weifeng Xu" userId="e7aed605-a3dd-4d5a-a692-a87037af107b" providerId="ADAL" clId="{519CFF70-A104-4BE5-B7AF-E221F0BC4D16}" dt="2025-04-03T12:16:06.446" v="229" actId="14100"/>
           <ac:picMkLst>
@@ -5222,6 +5284,60 @@
             <ac:picMk id="3" creationId="{C7335FA0-4F9A-A248-F19B-075CC2A5FE78}"/>
           </ac:picMkLst>
         </pc:picChg>
+      </pc:sldChg>
+      <pc:sldChg chg="addSp delSp modSp new mod modClrScheme chgLayout">
+        <pc:chgData name="Weifeng Xu" userId="e7aed605-a3dd-4d5a-a692-a87037af107b" providerId="ADAL" clId="{519CFF70-A104-4BE5-B7AF-E221F0BC4D16}" dt="2025-04-07T17:15:56.595" v="257" actId="20577"/>
+        <pc:sldMkLst>
+          <pc:docMk/>
+          <pc:sldMk cId="1036379805" sldId="504"/>
+        </pc:sldMkLst>
+        <pc:spChg chg="del mod ord">
+          <ac:chgData name="Weifeng Xu" userId="e7aed605-a3dd-4d5a-a692-a87037af107b" providerId="ADAL" clId="{519CFF70-A104-4BE5-B7AF-E221F0BC4D16}" dt="2025-04-07T17:15:45.051" v="252" actId="700"/>
+          <ac:spMkLst>
+            <pc:docMk/>
+            <pc:sldMk cId="1036379805" sldId="504"/>
+            <ac:spMk id="2" creationId="{74D42336-F3D6-2857-F7AD-9456D4C79B7B}"/>
+          </ac:spMkLst>
+        </pc:spChg>
+        <pc:spChg chg="del mod ord">
+          <ac:chgData name="Weifeng Xu" userId="e7aed605-a3dd-4d5a-a692-a87037af107b" providerId="ADAL" clId="{519CFF70-A104-4BE5-B7AF-E221F0BC4D16}" dt="2025-04-07T17:15:45.051" v="252" actId="700"/>
+          <ac:spMkLst>
+            <pc:docMk/>
+            <pc:sldMk cId="1036379805" sldId="504"/>
+            <ac:spMk id="3" creationId="{6615F10D-8F50-DF9F-3313-194A40EF085A}"/>
+          </ac:spMkLst>
+        </pc:spChg>
+        <pc:spChg chg="add mod ord">
+          <ac:chgData name="Weifeng Xu" userId="e7aed605-a3dd-4d5a-a692-a87037af107b" providerId="ADAL" clId="{519CFF70-A104-4BE5-B7AF-E221F0BC4D16}" dt="2025-04-07T17:15:56.595" v="257" actId="20577"/>
+          <ac:spMkLst>
+            <pc:docMk/>
+            <pc:sldMk cId="1036379805" sldId="504"/>
+            <ac:spMk id="4" creationId="{2F864675-3DFF-3BF5-459C-DD1FD5BE3BEE}"/>
+          </ac:spMkLst>
+        </pc:spChg>
+        <pc:spChg chg="add mod ord">
+          <ac:chgData name="Weifeng Xu" userId="e7aed605-a3dd-4d5a-a692-a87037af107b" providerId="ADAL" clId="{519CFF70-A104-4BE5-B7AF-E221F0BC4D16}" dt="2025-04-07T17:15:45.051" v="252" actId="700"/>
+          <ac:spMkLst>
+            <pc:docMk/>
+            <pc:sldMk cId="1036379805" sldId="504"/>
+            <ac:spMk id="5" creationId="{4563694A-6FA5-8AD1-B2D8-D256F48DC455}"/>
+          </ac:spMkLst>
+        </pc:spChg>
+      </pc:sldChg>
+      <pc:sldChg chg="modSp add mod">
+        <pc:chgData name="Weifeng Xu" userId="e7aed605-a3dd-4d5a-a692-a87037af107b" providerId="ADAL" clId="{519CFF70-A104-4BE5-B7AF-E221F0BC4D16}" dt="2025-04-07T17:17:26.728" v="328" actId="20577"/>
+        <pc:sldMkLst>
+          <pc:docMk/>
+          <pc:sldMk cId="3110483315" sldId="505"/>
+        </pc:sldMkLst>
+        <pc:spChg chg="mod">
+          <ac:chgData name="Weifeng Xu" userId="e7aed605-a3dd-4d5a-a692-a87037af107b" providerId="ADAL" clId="{519CFF70-A104-4BE5-B7AF-E221F0BC4D16}" dt="2025-04-07T17:17:26.728" v="328" actId="20577"/>
+          <ac:spMkLst>
+            <pc:docMk/>
+            <pc:sldMk cId="3110483315" sldId="505"/>
+            <ac:spMk id="4" creationId="{95CE8EB6-B960-E4BF-E0D7-8ACA72A042AE}"/>
+          </ac:spMkLst>
+        </pc:spChg>
       </pc:sldChg>
     </pc:docChg>
   </pc:docChgLst>
@@ -6633,7 +6749,7 @@
           <a:p>
             <a:fld id="{EE41F6E3-57F9-402E-BDBA-5B2DE11C8530}" type="datetimeFigureOut">
               <a:rPr lang="en-US" smtClean="0"/>
-              <a:t>4/3/2025</a:t>
+              <a:t>4/7/2025</a:t>
             </a:fld>
             <a:endParaRPr lang="en-US"/>
           </a:p>
@@ -7057,7 +7173,7 @@
           <a:p>
             <a:fld id="{DDBF98C7-164A-4723-84F0-B1E4B080DDEC}" type="slidenum">
               <a:rPr lang="en-US" smtClean="0"/>
-              <a:t>7</a:t>
+              <a:t>9</a:t>
             </a:fld>
             <a:endParaRPr lang="en-US"/>
           </a:p>
@@ -7121,10 +7237,28 @@
           <a:lstStyle/>
           <a:p>
             <a:r>
-              <a:rPr lang="en-US">
+              <a:rPr lang="en-US" dirty="0" err="1">
                 <a:cs typeface="Calibri"/>
               </a:rPr>
-              <a:t>Cmd: tree 'Pixel 3/data/data/com.android.providers.calendar/databases'</a:t>
+              <a:t>Cmd</a:t>
+            </a:r>
+            <a:r>
+              <a:rPr lang="en-US" dirty="0">
+                <a:cs typeface="Calibri"/>
+              </a:rPr>
+              <a:t>: tree 'Pixel 3/data/data/</a:t>
+            </a:r>
+            <a:r>
+              <a:rPr lang="en-US" dirty="0" err="1">
+                <a:cs typeface="Calibri"/>
+              </a:rPr>
+              <a:t>com.android.providers.calendar</a:t>
+            </a:r>
+            <a:r>
+              <a:rPr lang="en-US" dirty="0">
+                <a:cs typeface="Calibri"/>
+              </a:rPr>
+              <a:t>/databases'</a:t>
             </a:r>
           </a:p>
         </p:txBody>
@@ -7146,7 +7280,7 @@
           <a:p>
             <a:fld id="{DDBF98C7-164A-4723-84F0-B1E4B080DDEC}" type="slidenum">
               <a:rPr lang="en-US" smtClean="0"/>
-              <a:t>8</a:t>
+              <a:t>10</a:t>
             </a:fld>
             <a:endParaRPr lang="en-US"/>
           </a:p>
@@ -7235,7 +7369,7 @@
           <a:p>
             <a:fld id="{DDBF98C7-164A-4723-84F0-B1E4B080DDEC}" type="slidenum">
               <a:rPr lang="en-US" smtClean="0"/>
-              <a:t>9</a:t>
+              <a:t>11</a:t>
             </a:fld>
             <a:endParaRPr lang="en-US"/>
           </a:p>
@@ -7383,7 +7517,7 @@
           <a:p>
             <a:fld id="{4263717A-E3C1-4BED-ABE0-B7069385E023}" type="datetimeFigureOut">
               <a:rPr lang="en-US" smtClean="0"/>
-              <a:t>4/3/2025</a:t>
+              <a:t>4/7/2025</a:t>
             </a:fld>
             <a:endParaRPr lang="en-US"/>
           </a:p>
@@ -7556,7 +7690,7 @@
           <a:p>
             <a:fld id="{4263717A-E3C1-4BED-ABE0-B7069385E023}" type="datetimeFigureOut">
               <a:rPr lang="en-US" smtClean="0"/>
-              <a:t>4/3/2025</a:t>
+              <a:t>4/7/2025</a:t>
             </a:fld>
             <a:endParaRPr lang="en-US"/>
           </a:p>
@@ -7734,7 +7868,7 @@
           <a:p>
             <a:fld id="{4263717A-E3C1-4BED-ABE0-B7069385E023}" type="datetimeFigureOut">
               <a:rPr lang="en-US" smtClean="0"/>
-              <a:t>4/3/2025</a:t>
+              <a:t>4/7/2025</a:t>
             </a:fld>
             <a:endParaRPr lang="en-US"/>
           </a:p>
@@ -7902,7 +8036,7 @@
           <a:p>
             <a:fld id="{4263717A-E3C1-4BED-ABE0-B7069385E023}" type="datetimeFigureOut">
               <a:rPr lang="en-US" smtClean="0"/>
-              <a:t>4/3/2025</a:t>
+              <a:t>4/7/2025</a:t>
             </a:fld>
             <a:endParaRPr lang="en-US"/>
           </a:p>
@@ -8147,7 +8281,7 @@
           <a:p>
             <a:fld id="{4263717A-E3C1-4BED-ABE0-B7069385E023}" type="datetimeFigureOut">
               <a:rPr lang="en-US" smtClean="0"/>
-              <a:t>4/3/2025</a:t>
+              <a:t>4/7/2025</a:t>
             </a:fld>
             <a:endParaRPr lang="en-US"/>
           </a:p>
@@ -8376,7 +8510,7 @@
           <a:p>
             <a:fld id="{4263717A-E3C1-4BED-ABE0-B7069385E023}" type="datetimeFigureOut">
               <a:rPr lang="en-US" smtClean="0"/>
-              <a:t>4/3/2025</a:t>
+              <a:t>4/7/2025</a:t>
             </a:fld>
             <a:endParaRPr lang="en-US"/>
           </a:p>
@@ -8740,7 +8874,7 @@
           <a:p>
             <a:fld id="{4263717A-E3C1-4BED-ABE0-B7069385E023}" type="datetimeFigureOut">
               <a:rPr lang="en-US" smtClean="0"/>
-              <a:t>4/3/2025</a:t>
+              <a:t>4/7/2025</a:t>
             </a:fld>
             <a:endParaRPr lang="en-US"/>
           </a:p>
@@ -8857,7 +8991,7 @@
           <a:p>
             <a:fld id="{4263717A-E3C1-4BED-ABE0-B7069385E023}" type="datetimeFigureOut">
               <a:rPr lang="en-US" smtClean="0"/>
-              <a:t>4/3/2025</a:t>
+              <a:t>4/7/2025</a:t>
             </a:fld>
             <a:endParaRPr lang="en-US"/>
           </a:p>
@@ -8952,7 +9086,7 @@
           <a:p>
             <a:fld id="{4263717A-E3C1-4BED-ABE0-B7069385E023}" type="datetimeFigureOut">
               <a:rPr lang="en-US" smtClean="0"/>
-              <a:t>4/3/2025</a:t>
+              <a:t>4/7/2025</a:t>
             </a:fld>
             <a:endParaRPr lang="en-US"/>
           </a:p>
@@ -9227,7 +9361,7 @@
           <a:p>
             <a:fld id="{4263717A-E3C1-4BED-ABE0-B7069385E023}" type="datetimeFigureOut">
               <a:rPr lang="en-US" smtClean="0"/>
-              <a:t>4/3/2025</a:t>
+              <a:t>4/7/2025</a:t>
             </a:fld>
             <a:endParaRPr lang="en-US"/>
           </a:p>
@@ -9479,7 +9613,7 @@
           <a:p>
             <a:fld id="{4263717A-E3C1-4BED-ABE0-B7069385E023}" type="datetimeFigureOut">
               <a:rPr lang="en-US" smtClean="0"/>
-              <a:t>4/3/2025</a:t>
+              <a:t>4/7/2025</a:t>
             </a:fld>
             <a:endParaRPr lang="en-US"/>
           </a:p>
@@ -9690,7 +9824,7 @@
           <a:p>
             <a:fld id="{4263717A-E3C1-4BED-ABE0-B7069385E023}" type="datetimeFigureOut">
               <a:rPr lang="en-US" smtClean="0"/>
-              <a:t>4/3/2025</a:t>
+              <a:t>4/7/2025</a:t>
             </a:fld>
             <a:endParaRPr lang="en-US"/>
           </a:p>
@@ -10355,6 +10489,569 @@
           <p:cNvPr id="2" name="Title 1">
             <a:extLst>
               <a:ext uri="{FF2B5EF4-FFF2-40B4-BE49-F238E27FC236}">
+                <a16:creationId xmlns:a16="http://schemas.microsoft.com/office/drawing/2014/main" id="{88A96AAE-54C7-4A67-B297-1D11C1D82726}"/>
+              </a:ext>
+            </a:extLst>
+          </p:cNvPr>
+          <p:cNvSpPr>
+            <a:spLocks noGrp="1"/>
+          </p:cNvSpPr>
+          <p:nvPr>
+            <p:ph type="title"/>
+          </p:nvPr>
+        </p:nvSpPr>
+        <p:spPr/>
+        <p:txBody>
+          <a:bodyPr/>
+          <a:lstStyle/>
+          <a:p>
+            <a:r>
+              <a:rPr lang="en-US" dirty="0" err="1">
+                <a:solidFill>
+                  <a:schemeClr val="accent2"/>
+                </a:solidFill>
+                <a:cs typeface="Calibri Light"/>
+              </a:rPr>
+              <a:t>calendar.db</a:t>
+            </a:r>
+            <a:r>
+              <a:rPr lang="en-US" dirty="0">
+                <a:solidFill>
+                  <a:schemeClr val="accent2"/>
+                </a:solidFill>
+                <a:cs typeface="Calibri Light"/>
+              </a:rPr>
+              <a:t> </a:t>
+            </a:r>
+            <a:r>
+              <a:rPr lang="en-US" dirty="0">
+                <a:cs typeface="Calibri Light"/>
+              </a:rPr>
+              <a:t>location</a:t>
+            </a:r>
+            <a:r>
+              <a:rPr lang="en-US" dirty="0">
+                <a:solidFill>
+                  <a:schemeClr val="accent2"/>
+                </a:solidFill>
+                <a:cs typeface="Calibri Light"/>
+              </a:rPr>
+              <a:t> </a:t>
+            </a:r>
+            <a:endParaRPr lang="en-US" dirty="0">
+              <a:solidFill>
+                <a:schemeClr val="accent2"/>
+              </a:solidFill>
+            </a:endParaRPr>
+          </a:p>
+        </p:txBody>
+      </p:sp>
+      <p:pic>
+        <p:nvPicPr>
+          <p:cNvPr id="5" name="Picture 5" descr="A picture containing logo&#10;&#10;Description automatically generated">
+            <a:extLst>
+              <a:ext uri="{FF2B5EF4-FFF2-40B4-BE49-F238E27FC236}">
+                <a16:creationId xmlns:a16="http://schemas.microsoft.com/office/drawing/2014/main" id="{8AEDF05A-60F2-4524-8451-C5C728E103BB}"/>
+              </a:ext>
+            </a:extLst>
+          </p:cNvPr>
+          <p:cNvPicPr>
+            <a:picLocks noChangeAspect="1"/>
+          </p:cNvPicPr>
+          <p:nvPr/>
+        </p:nvPicPr>
+        <p:blipFill>
+          <a:blip r:embed="rId3"/>
+          <a:stretch>
+            <a:fillRect/>
+          </a:stretch>
+        </p:blipFill>
+        <p:spPr>
+          <a:xfrm>
+            <a:off x="838200" y="2467080"/>
+            <a:ext cx="10233837" cy="2145751"/>
+          </a:xfrm>
+          <a:prstGeom prst="rect">
+            <a:avLst/>
+          </a:prstGeom>
+        </p:spPr>
+      </p:pic>
+      <p:sp>
+        <p:nvSpPr>
+          <p:cNvPr id="6" name="Rectangle 5">
+            <a:extLst>
+              <a:ext uri="{FF2B5EF4-FFF2-40B4-BE49-F238E27FC236}">
+                <a16:creationId xmlns:a16="http://schemas.microsoft.com/office/drawing/2014/main" id="{383E0541-0D55-451D-AAD3-ADD4C9225F75}"/>
+              </a:ext>
+            </a:extLst>
+          </p:cNvPr>
+          <p:cNvSpPr/>
+          <p:nvPr/>
+        </p:nvSpPr>
+        <p:spPr>
+          <a:xfrm>
+            <a:off x="1498442" y="3025069"/>
+            <a:ext cx="9502711" cy="313554"/>
+          </a:xfrm>
+          <a:prstGeom prst="rect">
+            <a:avLst/>
+          </a:prstGeom>
+          <a:noFill/>
+          <a:ln w="28575">
+            <a:solidFill>
+              <a:srgbClr val="FF0000"/>
+            </a:solidFill>
+          </a:ln>
+        </p:spPr>
+        <p:style>
+          <a:lnRef idx="2">
+            <a:schemeClr val="accent1">
+              <a:shade val="50000"/>
+            </a:schemeClr>
+          </a:lnRef>
+          <a:fillRef idx="1">
+            <a:schemeClr val="accent1"/>
+          </a:fillRef>
+          <a:effectRef idx="0">
+            <a:schemeClr val="accent1"/>
+          </a:effectRef>
+          <a:fontRef idx="minor">
+            <a:schemeClr val="lt1"/>
+          </a:fontRef>
+        </p:style>
+        <p:txBody>
+          <a:bodyPr rtlCol="0" anchor="ctr"/>
+          <a:lstStyle/>
+          <a:p>
+            <a:pPr algn="ctr"/>
+            <a:endParaRPr lang="en-US"/>
+          </a:p>
+        </p:txBody>
+      </p:sp>
+    </p:spTree>
+    <p:extLst>
+      <p:ext uri="{BB962C8B-B14F-4D97-AF65-F5344CB8AC3E}">
+        <p14:creationId xmlns:p14="http://schemas.microsoft.com/office/powerpoint/2010/main" val="46822973"/>
+      </p:ext>
+    </p:extLst>
+  </p:cSld>
+  <p:clrMapOvr>
+    <a:masterClrMapping/>
+  </p:clrMapOvr>
+</p:sld>
+</file>
+
+<file path=ppt/slides/slide11.xml><?xml version="1.0" encoding="utf-8"?>
+<p:sld xmlns:a="http://schemas.openxmlformats.org/drawingml/2006/main" xmlns:r="http://schemas.openxmlformats.org/officeDocument/2006/relationships" xmlns:p="http://schemas.openxmlformats.org/presentationml/2006/main">
+  <p:cSld>
+    <p:spTree>
+      <p:nvGrpSpPr>
+        <p:cNvPr id="1" name=""/>
+        <p:cNvGrpSpPr/>
+        <p:nvPr/>
+      </p:nvGrpSpPr>
+      <p:grpSpPr>
+        <a:xfrm>
+          <a:off x="0" y="0"/>
+          <a:ext cx="0" cy="0"/>
+          <a:chOff x="0" y="0"/>
+          <a:chExt cx="0" cy="0"/>
+        </a:xfrm>
+      </p:grpSpPr>
+      <p:sp>
+        <p:nvSpPr>
+          <p:cNvPr id="2" name="Title 1">
+            <a:extLst>
+              <a:ext uri="{FF2B5EF4-FFF2-40B4-BE49-F238E27FC236}">
+                <a16:creationId xmlns:a16="http://schemas.microsoft.com/office/drawing/2014/main" id="{B23D5793-2D2E-4A05-BBDB-A78A693AE53B}"/>
+              </a:ext>
+            </a:extLst>
+          </p:cNvPr>
+          <p:cNvSpPr>
+            <a:spLocks noGrp="1"/>
+          </p:cNvSpPr>
+          <p:nvPr>
+            <p:ph type="title"/>
+          </p:nvPr>
+        </p:nvSpPr>
+        <p:spPr/>
+        <p:txBody>
+          <a:bodyPr/>
+          <a:lstStyle/>
+          <a:p>
+            <a:r>
+              <a:rPr lang="en-US" dirty="0">
+                <a:cs typeface="Calibri Light"/>
+              </a:rPr>
+              <a:t>Examine </a:t>
+            </a:r>
+            <a:r>
+              <a:rPr lang="en-US" dirty="0" err="1">
+                <a:solidFill>
+                  <a:schemeClr val="accent2"/>
+                </a:solidFill>
+                <a:cs typeface="Calibri Light"/>
+              </a:rPr>
+              <a:t>calendar.db</a:t>
+            </a:r>
+            <a:r>
+              <a:rPr lang="en-US" dirty="0">
+                <a:solidFill>
+                  <a:schemeClr val="accent2"/>
+                </a:solidFill>
+                <a:cs typeface="Calibri Light"/>
+              </a:rPr>
+              <a:t> </a:t>
+            </a:r>
+            <a:endParaRPr lang="en-US" dirty="0"/>
+          </a:p>
+        </p:txBody>
+      </p:sp>
+      <p:pic>
+        <p:nvPicPr>
+          <p:cNvPr id="5" name="Picture 4" descr="Text&#10;&#10;Description automatically generated">
+            <a:extLst>
+              <a:ext uri="{FF2B5EF4-FFF2-40B4-BE49-F238E27FC236}">
+                <a16:creationId xmlns:a16="http://schemas.microsoft.com/office/drawing/2014/main" id="{49EA2546-C8EF-4AC8-8747-47AF64C5169C}"/>
+              </a:ext>
+            </a:extLst>
+          </p:cNvPr>
+          <p:cNvPicPr>
+            <a:picLocks noChangeAspect="1"/>
+          </p:cNvPicPr>
+          <p:nvPr/>
+        </p:nvPicPr>
+        <p:blipFill>
+          <a:blip r:embed="rId3"/>
+          <a:stretch>
+            <a:fillRect/>
+          </a:stretch>
+        </p:blipFill>
+        <p:spPr>
+          <a:xfrm>
+            <a:off x="839036" y="1881114"/>
+            <a:ext cx="10677568" cy="856114"/>
+          </a:xfrm>
+          <a:prstGeom prst="rect">
+            <a:avLst/>
+          </a:prstGeom>
+        </p:spPr>
+      </p:pic>
+      <p:pic>
+        <p:nvPicPr>
+          <p:cNvPr id="7" name="Picture 6" descr="Graphical user interface, text, application&#10;&#10;Description automatically generated">
+            <a:extLst>
+              <a:ext uri="{FF2B5EF4-FFF2-40B4-BE49-F238E27FC236}">
+                <a16:creationId xmlns:a16="http://schemas.microsoft.com/office/drawing/2014/main" id="{69CDA6A5-0B40-476D-8B25-8B1F60C519F9}"/>
+              </a:ext>
+            </a:extLst>
+          </p:cNvPr>
+          <p:cNvPicPr>
+            <a:picLocks noChangeAspect="1"/>
+          </p:cNvPicPr>
+          <p:nvPr/>
+        </p:nvPicPr>
+        <p:blipFill>
+          <a:blip r:embed="rId4"/>
+          <a:stretch>
+            <a:fillRect/>
+          </a:stretch>
+        </p:blipFill>
+        <p:spPr>
+          <a:xfrm>
+            <a:off x="5901488" y="3105085"/>
+            <a:ext cx="5650622" cy="3265503"/>
+          </a:xfrm>
+          <a:prstGeom prst="rect">
+            <a:avLst/>
+          </a:prstGeom>
+        </p:spPr>
+      </p:pic>
+      <p:sp>
+        <p:nvSpPr>
+          <p:cNvPr id="8" name="TextBox 7">
+            <a:extLst>
+              <a:ext uri="{FF2B5EF4-FFF2-40B4-BE49-F238E27FC236}">
+                <a16:creationId xmlns:a16="http://schemas.microsoft.com/office/drawing/2014/main" id="{44428CDD-ABDD-43D0-AC19-D3F74162BD84}"/>
+              </a:ext>
+            </a:extLst>
+          </p:cNvPr>
+          <p:cNvSpPr txBox="1"/>
+          <p:nvPr/>
+        </p:nvSpPr>
+        <p:spPr>
+          <a:xfrm>
+            <a:off x="838200" y="3107849"/>
+            <a:ext cx="4788568" cy="1938992"/>
+          </a:xfrm>
+          <a:prstGeom prst="rect">
+            <a:avLst/>
+          </a:prstGeom>
+          <a:noFill/>
+        </p:spPr>
+        <p:txBody>
+          <a:bodyPr rot="0" spcFirstLastPara="0" vertOverflow="overflow" horzOverflow="overflow" vert="horz" wrap="square" lIns="91440" tIns="45720" rIns="91440" bIns="45720" numCol="1" spcCol="0" rtlCol="0" fromWordArt="0" anchor="t" anchorCtr="0" forceAA="0" compatLnSpc="1">
+            <a:prstTxWarp prst="textNoShape">
+              <a:avLst/>
+            </a:prstTxWarp>
+            <a:spAutoFit/>
+          </a:bodyPr>
+          <a:lstStyle/>
+          <a:p>
+            <a:pPr marL="285750" indent="-285750">
+              <a:buFont typeface="Arial"/>
+              <a:buChar char="•"/>
+            </a:pPr>
+            <a:r>
+              <a:rPr lang="en-US" sz="2400" dirty="0">
+                <a:cs typeface="Calibri"/>
+              </a:rPr>
+              <a:t>Tables to focus on: attendees, events, reminders</a:t>
+            </a:r>
+          </a:p>
+          <a:p>
+            <a:pPr marL="285750" indent="-285750">
+              <a:buFont typeface="Arial"/>
+              <a:buChar char="•"/>
+            </a:pPr>
+            <a:endParaRPr lang="en-US" sz="2400" dirty="0">
+              <a:cs typeface="Calibri"/>
+            </a:endParaRPr>
+          </a:p>
+          <a:p>
+            <a:pPr marL="285750" indent="-285750">
+              <a:buFont typeface="Arial"/>
+              <a:buChar char="•"/>
+            </a:pPr>
+            <a:r>
+              <a:rPr lang="en-US" sz="2400" dirty="0">
+                <a:cs typeface="Calibri"/>
+              </a:rPr>
+              <a:t>In this case there isn't any data to look at in any of the tables</a:t>
+            </a:r>
+          </a:p>
+        </p:txBody>
+      </p:sp>
+      <p:sp>
+        <p:nvSpPr>
+          <p:cNvPr id="9" name="Rectangle 8">
+            <a:extLst>
+              <a:ext uri="{FF2B5EF4-FFF2-40B4-BE49-F238E27FC236}">
+                <a16:creationId xmlns:a16="http://schemas.microsoft.com/office/drawing/2014/main" id="{439BBE62-E442-49FE-A5A1-59F6D538371E}"/>
+              </a:ext>
+            </a:extLst>
+          </p:cNvPr>
+          <p:cNvSpPr/>
+          <p:nvPr/>
+        </p:nvSpPr>
+        <p:spPr>
+          <a:xfrm>
+            <a:off x="1298073" y="2331145"/>
+            <a:ext cx="10226841" cy="387683"/>
+          </a:xfrm>
+          <a:prstGeom prst="rect">
+            <a:avLst/>
+          </a:prstGeom>
+          <a:noFill/>
+          <a:ln w="28575">
+            <a:solidFill>
+              <a:srgbClr val="FF0000"/>
+            </a:solidFill>
+          </a:ln>
+        </p:spPr>
+        <p:style>
+          <a:lnRef idx="2">
+            <a:schemeClr val="accent1">
+              <a:shade val="50000"/>
+            </a:schemeClr>
+          </a:lnRef>
+          <a:fillRef idx="1">
+            <a:schemeClr val="accent1"/>
+          </a:fillRef>
+          <a:effectRef idx="0">
+            <a:schemeClr val="accent1"/>
+          </a:effectRef>
+          <a:fontRef idx="minor">
+            <a:schemeClr val="lt1"/>
+          </a:fontRef>
+        </p:style>
+        <p:txBody>
+          <a:bodyPr rtlCol="0" anchor="ctr"/>
+          <a:lstStyle/>
+          <a:p>
+            <a:pPr algn="ctr"/>
+            <a:endParaRPr lang="en-US"/>
+          </a:p>
+        </p:txBody>
+      </p:sp>
+      <p:sp>
+        <p:nvSpPr>
+          <p:cNvPr id="11" name="TextBox 1">
+            <a:extLst>
+              <a:ext uri="{FF2B5EF4-FFF2-40B4-BE49-F238E27FC236}">
+                <a16:creationId xmlns:a16="http://schemas.microsoft.com/office/drawing/2014/main" id="{D7049351-4E8A-4FBD-9C7D-8779B20AC091}"/>
+              </a:ext>
+            </a:extLst>
+          </p:cNvPr>
+          <p:cNvSpPr txBox="1"/>
+          <p:nvPr/>
+        </p:nvSpPr>
+        <p:spPr>
+          <a:xfrm>
+            <a:off x="5908896" y="2742083"/>
+            <a:ext cx="1902572" cy="369332"/>
+          </a:xfrm>
+          <a:prstGeom prst="rect">
+            <a:avLst/>
+          </a:prstGeom>
+          <a:solidFill>
+            <a:schemeClr val="accent4"/>
+          </a:solidFill>
+        </p:spPr>
+        <p:txBody>
+          <a:bodyPr wrap="none" lIns="91440" tIns="45720" rIns="91440" bIns="45720" rtlCol="0" anchor="t">
+            <a:spAutoFit/>
+          </a:bodyPr>
+          <a:lstStyle>
+            <a:defPPr>
+              <a:defRPr lang="en-US"/>
+            </a:defPPr>
+            <a:lvl1pPr marL="0" algn="l" defTabSz="914400" rtl="0" eaLnBrk="1" latinLnBrk="0" hangingPunct="1">
+              <a:defRPr sz="1800" kern="1200">
+                <a:solidFill>
+                  <a:schemeClr val="tx1"/>
+                </a:solidFill>
+                <a:latin typeface="+mn-lt"/>
+                <a:ea typeface="+mn-ea"/>
+                <a:cs typeface="+mn-cs"/>
+              </a:defRPr>
+            </a:lvl1pPr>
+            <a:lvl2pPr marL="457200" algn="l" defTabSz="914400" rtl="0" eaLnBrk="1" latinLnBrk="0" hangingPunct="1">
+              <a:defRPr sz="1800" kern="1200">
+                <a:solidFill>
+                  <a:schemeClr val="tx1"/>
+                </a:solidFill>
+                <a:latin typeface="+mn-lt"/>
+                <a:ea typeface="+mn-ea"/>
+                <a:cs typeface="+mn-cs"/>
+              </a:defRPr>
+            </a:lvl2pPr>
+            <a:lvl3pPr marL="914400" algn="l" defTabSz="914400" rtl="0" eaLnBrk="1" latinLnBrk="0" hangingPunct="1">
+              <a:defRPr sz="1800" kern="1200">
+                <a:solidFill>
+                  <a:schemeClr val="tx1"/>
+                </a:solidFill>
+                <a:latin typeface="+mn-lt"/>
+                <a:ea typeface="+mn-ea"/>
+                <a:cs typeface="+mn-cs"/>
+              </a:defRPr>
+            </a:lvl3pPr>
+            <a:lvl4pPr marL="1371600" algn="l" defTabSz="914400" rtl="0" eaLnBrk="1" latinLnBrk="0" hangingPunct="1">
+              <a:defRPr sz="1800" kern="1200">
+                <a:solidFill>
+                  <a:schemeClr val="tx1"/>
+                </a:solidFill>
+                <a:latin typeface="+mn-lt"/>
+                <a:ea typeface="+mn-ea"/>
+                <a:cs typeface="+mn-cs"/>
+              </a:defRPr>
+            </a:lvl4pPr>
+            <a:lvl5pPr marL="1828800" algn="l" defTabSz="914400" rtl="0" eaLnBrk="1" latinLnBrk="0" hangingPunct="1">
+              <a:defRPr sz="1800" kern="1200">
+                <a:solidFill>
+                  <a:schemeClr val="tx1"/>
+                </a:solidFill>
+                <a:latin typeface="+mn-lt"/>
+                <a:ea typeface="+mn-ea"/>
+                <a:cs typeface="+mn-cs"/>
+              </a:defRPr>
+            </a:lvl5pPr>
+            <a:lvl6pPr marL="2286000" algn="l" defTabSz="914400" rtl="0" eaLnBrk="1" latinLnBrk="0" hangingPunct="1">
+              <a:defRPr sz="1800" kern="1200">
+                <a:solidFill>
+                  <a:schemeClr val="tx1"/>
+                </a:solidFill>
+                <a:latin typeface="+mn-lt"/>
+                <a:ea typeface="+mn-ea"/>
+                <a:cs typeface="+mn-cs"/>
+              </a:defRPr>
+            </a:lvl6pPr>
+            <a:lvl7pPr marL="2743200" algn="l" defTabSz="914400" rtl="0" eaLnBrk="1" latinLnBrk="0" hangingPunct="1">
+              <a:defRPr sz="1800" kern="1200">
+                <a:solidFill>
+                  <a:schemeClr val="tx1"/>
+                </a:solidFill>
+                <a:latin typeface="+mn-lt"/>
+                <a:ea typeface="+mn-ea"/>
+                <a:cs typeface="+mn-cs"/>
+              </a:defRPr>
+            </a:lvl7pPr>
+            <a:lvl8pPr marL="3200400" algn="l" defTabSz="914400" rtl="0" eaLnBrk="1" latinLnBrk="0" hangingPunct="1">
+              <a:defRPr sz="1800" kern="1200">
+                <a:solidFill>
+                  <a:schemeClr val="tx1"/>
+                </a:solidFill>
+                <a:latin typeface="+mn-lt"/>
+                <a:ea typeface="+mn-ea"/>
+                <a:cs typeface="+mn-cs"/>
+              </a:defRPr>
+            </a:lvl8pPr>
+            <a:lvl9pPr marL="3657600" algn="l" defTabSz="914400" rtl="0" eaLnBrk="1" latinLnBrk="0" hangingPunct="1">
+              <a:defRPr sz="1800" kern="1200">
+                <a:solidFill>
+                  <a:schemeClr val="tx1"/>
+                </a:solidFill>
+                <a:latin typeface="+mn-lt"/>
+                <a:ea typeface="+mn-ea"/>
+                <a:cs typeface="+mn-cs"/>
+              </a:defRPr>
+            </a:lvl9pPr>
+          </a:lstStyle>
+          <a:p>
+            <a:r>
+              <a:rPr lang="en-US">
+                <a:cs typeface="Calibri"/>
+              </a:rPr>
+              <a:t>Tables in database</a:t>
+            </a:r>
+          </a:p>
+        </p:txBody>
+      </p:sp>
+    </p:spTree>
+    <p:extLst>
+      <p:ext uri="{BB962C8B-B14F-4D97-AF65-F5344CB8AC3E}">
+        <p14:creationId xmlns:p14="http://schemas.microsoft.com/office/powerpoint/2010/main" val="3735861723"/>
+      </p:ext>
+    </p:extLst>
+  </p:cSld>
+  <p:clrMapOvr>
+    <a:masterClrMapping/>
+  </p:clrMapOvr>
+</p:sld>
+</file>
+
+<file path=ppt/slides/slide12.xml><?xml version="1.0" encoding="utf-8"?>
+<p:sld xmlns:a="http://schemas.openxmlformats.org/drawingml/2006/main" xmlns:r="http://schemas.openxmlformats.org/officeDocument/2006/relationships" xmlns:p="http://schemas.openxmlformats.org/presentationml/2006/main">
+  <p:cSld>
+    <p:spTree>
+      <p:nvGrpSpPr>
+        <p:cNvPr id="1" name=""/>
+        <p:cNvGrpSpPr/>
+        <p:nvPr/>
+      </p:nvGrpSpPr>
+      <p:grpSpPr>
+        <a:xfrm>
+          <a:off x="0" y="0"/>
+          <a:ext cx="0" cy="0"/>
+          <a:chOff x="0" y="0"/>
+          <a:chExt cx="0" cy="0"/>
+        </a:xfrm>
+      </p:grpSpPr>
+      <p:sp>
+        <p:nvSpPr>
+          <p:cNvPr id="2" name="Title 1">
+            <a:extLst>
+              <a:ext uri="{FF2B5EF4-FFF2-40B4-BE49-F238E27FC236}">
                 <a16:creationId xmlns:a16="http://schemas.microsoft.com/office/drawing/2014/main" id="{E7843248-F2B4-039B-04B8-F2AA64A4280C}"/>
               </a:ext>
             </a:extLst>
@@ -10577,7 +11274,7 @@
 </p:sld>
 </file>
 
-<file path=ppt/slides/slide11.xml><?xml version="1.0" encoding="utf-8"?>
+<file path=ppt/slides/slide13.xml><?xml version="1.0" encoding="utf-8"?>
 <p:sld xmlns:a="http://schemas.openxmlformats.org/drawingml/2006/main" xmlns:r="http://schemas.openxmlformats.org/officeDocument/2006/relationships" xmlns:p="http://schemas.openxmlformats.org/presentationml/2006/main">
   <p:cSld>
     <p:spTree>
@@ -10706,7 +11403,7 @@
 </p:sld>
 </file>
 
-<file path=ppt/slides/slide12.xml><?xml version="1.0" encoding="utf-8"?>
+<file path=ppt/slides/slide14.xml><?xml version="1.0" encoding="utf-8"?>
 <p:sld xmlns:a="http://schemas.openxmlformats.org/drawingml/2006/main" xmlns:r="http://schemas.openxmlformats.org/officeDocument/2006/relationships" xmlns:p="http://schemas.openxmlformats.org/presentationml/2006/main">
   <p:cSld>
     <p:spTree>
@@ -10766,7 +11463,7 @@
 </p:sld>
 </file>
 
-<file path=ppt/slides/slide13.xml><?xml version="1.0" encoding="utf-8"?>
+<file path=ppt/slides/slide15.xml><?xml version="1.0" encoding="utf-8"?>
 <p:sld xmlns:a="http://schemas.openxmlformats.org/drawingml/2006/main" xmlns:r="http://schemas.openxmlformats.org/officeDocument/2006/relationships" xmlns:p="http://schemas.openxmlformats.org/presentationml/2006/main">
   <p:cSld>
     <p:spTree>
@@ -10826,7 +11523,7 @@
 </p:sld>
 </file>
 
-<file path=ppt/slides/slide14.xml><?xml version="1.0" encoding="utf-8"?>
+<file path=ppt/slides/slide16.xml><?xml version="1.0" encoding="utf-8"?>
 <p:sld xmlns:a="http://schemas.openxmlformats.org/drawingml/2006/main" xmlns:r="http://schemas.openxmlformats.org/officeDocument/2006/relationships" xmlns:p="http://schemas.openxmlformats.org/presentationml/2006/main">
   <p:cSld>
     <p:spTree>
@@ -10886,7 +11583,7 @@
 </p:sld>
 </file>
 
-<file path=ppt/slides/slide15.xml><?xml version="1.0" encoding="utf-8"?>
+<file path=ppt/slides/slide17.xml><?xml version="1.0" encoding="utf-8"?>
 <p:sld xmlns:a="http://schemas.openxmlformats.org/drawingml/2006/main" xmlns:r="http://schemas.openxmlformats.org/officeDocument/2006/relationships" xmlns:p="http://schemas.openxmlformats.org/presentationml/2006/main">
   <p:cSld>
     <p:spTree>
@@ -10946,7 +11643,7 @@
 </p:sld>
 </file>
 
-<file path=ppt/slides/slide16.xml><?xml version="1.0" encoding="utf-8"?>
+<file path=ppt/slides/slide18.xml><?xml version="1.0" encoding="utf-8"?>
 <p:sld xmlns:a="http://schemas.openxmlformats.org/drawingml/2006/main" xmlns:r="http://schemas.openxmlformats.org/officeDocument/2006/relationships" xmlns:p="http://schemas.openxmlformats.org/presentationml/2006/main">
   <p:cSld>
     <p:spTree>
@@ -10985,12 +11682,12 @@
           <a:lstStyle/>
           <a:p>
             <a:r>
-              <a:rPr lang="en-US">
+              <a:rPr lang="en-US" dirty="0">
                 <a:cs typeface="Calibri Light"/>
               </a:rPr>
-              <a:t>Solutions</a:t>
-            </a:r>
-            <a:endParaRPr lang="en-US"/>
+              <a:t>Summary</a:t>
+            </a:r>
+            <a:endParaRPr lang="en-US" dirty="0"/>
           </a:p>
         </p:txBody>
       </p:sp>
@@ -11021,20 +11718,20 @@
               <a:buNone/>
             </a:pPr>
             <a:r>
-              <a:rPr lang="en-US">
+              <a:rPr lang="en-US" dirty="0">
                 <a:ea typeface="+mn-lt"/>
                 <a:cs typeface="+mn-lt"/>
               </a:rPr>
               <a:t>What is the date of the scheduled event?</a:t>
             </a:r>
-            <a:endParaRPr lang="en-US">
+            <a:endParaRPr lang="en-US" dirty="0">
               <a:cs typeface="Calibri"/>
             </a:endParaRPr>
           </a:p>
           <a:p>
             <a:pPr lvl="1"/>
             <a:r>
-              <a:rPr lang="en-US">
+              <a:rPr lang="en-US" dirty="0">
                 <a:ea typeface="+mn-lt"/>
                 <a:cs typeface="+mn-lt"/>
               </a:rPr>
@@ -11046,7 +11743,7 @@
               <a:buNone/>
             </a:pPr>
             <a:r>
-              <a:rPr lang="en-US">
+              <a:rPr lang="en-US" dirty="0">
                 <a:ea typeface="+mn-lt"/>
                 <a:cs typeface="+mn-lt"/>
               </a:rPr>
@@ -11056,7 +11753,7 @@
           <a:p>
             <a:pPr lvl="1"/>
             <a:r>
-              <a:rPr lang="en-US">
+              <a:rPr lang="en-US" dirty="0">
                 <a:ea typeface="+mn-lt"/>
                 <a:cs typeface="+mn-lt"/>
               </a:rPr>
@@ -11068,7 +11765,7 @@
               <a:buNone/>
             </a:pPr>
             <a:r>
-              <a:rPr lang="en-US">
+              <a:rPr lang="en-US" dirty="0">
                 <a:ea typeface="+mn-lt"/>
                 <a:cs typeface="+mn-lt"/>
               </a:rPr>
@@ -11078,7 +11775,7 @@
           <a:p>
             <a:pPr lvl="1"/>
             <a:r>
-              <a:rPr lang="en-US">
+              <a:rPr lang="en-US" dirty="0">
                 <a:ea typeface="+mn-lt"/>
                 <a:cs typeface="+mn-lt"/>
               </a:rPr>
@@ -11090,7 +11787,7 @@
               <a:buNone/>
             </a:pPr>
             <a:r>
-              <a:rPr lang="en-US">
+              <a:rPr lang="en-US" dirty="0">
                 <a:ea typeface="+mn-lt"/>
                 <a:cs typeface="+mn-lt"/>
               </a:rPr>
@@ -11102,14 +11799,14 @@
               <a:buFont typeface="Arial"/>
             </a:pPr>
             <a:r>
-              <a:rPr lang="en-US">
+              <a:rPr lang="en-US" dirty="0">
                 <a:cs typeface="Calibri"/>
               </a:rPr>
               <a:t>Events table</a:t>
             </a:r>
           </a:p>
           <a:p>
-            <a:endParaRPr lang="en-US">
+            <a:endParaRPr lang="en-US" dirty="0">
               <a:cs typeface="Calibri"/>
             </a:endParaRPr>
           </a:p>
@@ -11128,7 +11825,7 @@
 </p:sld>
 </file>
 
-<file path=ppt/slides/slide17.xml><?xml version="1.0" encoding="utf-8"?>
+<file path=ppt/slides/slide2.xml><?xml version="1.0" encoding="utf-8"?>
 <p:sld xmlns:a="http://schemas.openxmlformats.org/drawingml/2006/main" xmlns:r="http://schemas.openxmlformats.org/officeDocument/2006/relationships" xmlns:p="http://schemas.openxmlformats.org/presentationml/2006/main">
   <p:cSld>
     <p:spTree>
@@ -11147,10 +11844,10 @@
       </p:grpSpPr>
       <p:sp>
         <p:nvSpPr>
-          <p:cNvPr id="2" name="Title 1">
+          <p:cNvPr id="4" name="Title 3">
             <a:extLst>
               <a:ext uri="{FF2B5EF4-FFF2-40B4-BE49-F238E27FC236}">
-                <a16:creationId xmlns:a16="http://schemas.microsoft.com/office/drawing/2014/main" id="{2BC2D130-9011-4F06-B0D9-B7A227B27E8C}"/>
+                <a16:creationId xmlns:a16="http://schemas.microsoft.com/office/drawing/2014/main" id="{2F864675-3DFF-3BF5-459C-DD1FD5BE3BEE}"/>
               </a:ext>
             </a:extLst>
           </p:cNvPr>
@@ -11167,21 +11864,18 @@
           <a:lstStyle/>
           <a:p>
             <a:r>
-              <a:rPr lang="en-US">
-                <a:cs typeface="Calibri Light"/>
-              </a:rPr>
-              <a:t>To summarize</a:t>
-            </a:r>
-            <a:endParaRPr lang="en-US"/>
+              <a:rPr lang="en-US" dirty="0"/>
+              <a:t>Calendar services</a:t>
+            </a:r>
           </a:p>
         </p:txBody>
       </p:sp>
       <p:sp>
         <p:nvSpPr>
-          <p:cNvPr id="3" name="Content Placeholder 2">
+          <p:cNvPr id="5" name="Text Placeholder 4">
             <a:extLst>
               <a:ext uri="{FF2B5EF4-FFF2-40B4-BE49-F238E27FC236}">
-                <a16:creationId xmlns:a16="http://schemas.microsoft.com/office/drawing/2014/main" id="{604533E3-51A2-4828-9C67-5DC0A216C68A}"/>
+                <a16:creationId xmlns:a16="http://schemas.microsoft.com/office/drawing/2014/main" id="{4563694A-6FA5-8AD1-B2D8-D256F48DC455}"/>
               </a:ext>
             </a:extLst>
           </p:cNvPr>
@@ -11189,107 +11883,22 @@
             <a:spLocks noGrp="1"/>
           </p:cNvSpPr>
           <p:nvPr>
-            <p:ph idx="1"/>
+            <p:ph type="body" idx="1"/>
           </p:nvPr>
         </p:nvSpPr>
         <p:spPr/>
         <p:txBody>
-          <a:bodyPr vert="horz" lIns="91440" tIns="45720" rIns="91440" bIns="45720" rtlCol="0" anchor="t">
-            <a:normAutofit/>
-          </a:bodyPr>
+          <a:bodyPr/>
           <a:lstStyle/>
           <a:p>
-            <a:r>
-              <a:rPr lang="en-US">
-                <a:cs typeface="Calibri"/>
-              </a:rPr>
-              <a:t>Understand the application</a:t>
-            </a:r>
-            <a:endParaRPr lang="en-US">
-              <a:ea typeface="+mn-lt"/>
-              <a:cs typeface="+mn-lt"/>
-            </a:endParaRPr>
-          </a:p>
-          <a:p>
-            <a:r>
-              <a:rPr lang="en-US">
-                <a:cs typeface="Calibri"/>
-              </a:rPr>
-              <a:t>Locate the calendar package</a:t>
-            </a:r>
-            <a:endParaRPr lang="en-US">
-              <a:ea typeface="+mn-lt"/>
-              <a:cs typeface="+mn-lt"/>
-            </a:endParaRPr>
-          </a:p>
-          <a:p>
-            <a:r>
-              <a:rPr lang="en-US">
-                <a:cs typeface="Calibri"/>
-              </a:rPr>
-              <a:t>Look at the application directories</a:t>
-            </a:r>
-            <a:endParaRPr lang="en-US">
-              <a:ea typeface="+mn-lt"/>
-              <a:cs typeface="+mn-lt"/>
-            </a:endParaRPr>
-          </a:p>
-          <a:p>
-            <a:r>
-              <a:rPr lang="en-US">
-                <a:ea typeface="+mn-lt"/>
-                <a:cs typeface="+mn-lt"/>
-              </a:rPr>
-              <a:t>Go to the "databases" directory</a:t>
-            </a:r>
-          </a:p>
-          <a:p>
-            <a:pPr marL="800100" lvl="1" indent="-342900">
-              <a:buFont typeface="Arial"/>
-              <a:buChar char="•"/>
-            </a:pPr>
-            <a:r>
-              <a:rPr lang="en-US">
-                <a:ea typeface="+mn-lt"/>
-                <a:cs typeface="+mn-lt"/>
-              </a:rPr>
-              <a:t>Open </a:t>
-            </a:r>
-            <a:r>
-              <a:rPr lang="en-US" err="1">
-                <a:ea typeface="+mn-lt"/>
-                <a:cs typeface="+mn-lt"/>
-              </a:rPr>
-              <a:t>calendar.db</a:t>
-            </a:r>
-          </a:p>
-          <a:p>
-            <a:pPr marL="800100" lvl="1" indent="-342900">
-              <a:buFont typeface="Arial"/>
-              <a:buChar char="•"/>
-            </a:pPr>
-            <a:r>
-              <a:rPr lang="en-US">
-                <a:ea typeface="+mn-lt"/>
-                <a:cs typeface="+mn-lt"/>
-              </a:rPr>
-              <a:t>Explore these tables: events, reminders</a:t>
-            </a:r>
-          </a:p>
-          <a:p>
-            <a:pPr marL="0" indent="0">
-              <a:buNone/>
-            </a:pPr>
-            <a:endParaRPr lang="en-US">
-              <a:cs typeface="Calibri"/>
-            </a:endParaRPr>
+            <a:endParaRPr lang="en-US"/>
           </a:p>
         </p:txBody>
       </p:sp>
     </p:spTree>
     <p:extLst>
       <p:ext uri="{BB962C8B-B14F-4D97-AF65-F5344CB8AC3E}">
-        <p14:creationId xmlns:p14="http://schemas.microsoft.com/office/powerpoint/2010/main" val="3552793750"/>
+        <p14:creationId xmlns:p14="http://schemas.microsoft.com/office/powerpoint/2010/main" val="1036379805"/>
       </p:ext>
     </p:extLst>
   </p:cSld>
@@ -11299,7 +11908,7 @@
 </p:sld>
 </file>
 
-<file path=ppt/slides/slide2.xml><?xml version="1.0" encoding="utf-8"?>
+<file path=ppt/slides/slide3.xml><?xml version="1.0" encoding="utf-8"?>
 <p:sld xmlns:a="http://schemas.openxmlformats.org/drawingml/2006/main" xmlns:r="http://schemas.openxmlformats.org/officeDocument/2006/relationships" xmlns:p="http://schemas.openxmlformats.org/presentationml/2006/main">
   <p:cSld>
     <p:spTree>
@@ -11371,7 +11980,7 @@
         </p:spPr>
         <p:txBody>
           <a:bodyPr vert="horz" lIns="91440" tIns="45720" rIns="91440" bIns="45720" rtlCol="0" anchor="t">
-            <a:normAutofit/>
+            <a:normAutofit lnSpcReduction="10000"/>
           </a:bodyPr>
           <a:lstStyle/>
           <a:p>
@@ -11381,6 +11990,24 @@
               </a:rPr>
               <a:t>Service for calendar apps</a:t>
             </a:r>
+          </a:p>
+          <a:p>
+            <a:pPr lvl="1"/>
+            <a:r>
+              <a:rPr lang="en-US" dirty="0" err="1">
+                <a:solidFill>
+                  <a:schemeClr val="accent2"/>
+                </a:solidFill>
+                <a:cs typeface="Calibri"/>
+              </a:rPr>
+              <a:t>com.android.providers.calendar</a:t>
+            </a:r>
+            <a:endParaRPr lang="en-US" dirty="0">
+              <a:solidFill>
+                <a:schemeClr val="accent2"/>
+              </a:solidFill>
+              <a:cs typeface="Calibri"/>
+            </a:endParaRPr>
           </a:p>
           <a:p>
             <a:r>
@@ -11563,7 +12190,7 @@
 </p:sld>
 </file>
 
-<file path=ppt/slides/slide3.xml><?xml version="1.0" encoding="utf-8"?>
+<file path=ppt/slides/slide4.xml><?xml version="1.0" encoding="utf-8"?>
 <p:sld xmlns:a="http://schemas.openxmlformats.org/drawingml/2006/main" xmlns:r="http://schemas.openxmlformats.org/officeDocument/2006/relationships" xmlns:p="http://schemas.openxmlformats.org/presentationml/2006/main">
   <p:cSld>
     <p:spTree>
@@ -11700,7 +12327,7 @@
 </p:sld>
 </file>
 
-<file path=ppt/slides/slide4.xml><?xml version="1.0" encoding="utf-8"?>
+<file path=ppt/slides/slide5.xml><?xml version="1.0" encoding="utf-8"?>
 <p:sld xmlns:a="http://schemas.openxmlformats.org/drawingml/2006/main" xmlns:r="http://schemas.openxmlformats.org/officeDocument/2006/relationships" xmlns:p="http://schemas.openxmlformats.org/presentationml/2006/main">
   <p:cSld>
     <p:spTree>
@@ -11801,7 +12428,7 @@
 </p:sld>
 </file>
 
-<file path=ppt/slides/slide5.xml><?xml version="1.0" encoding="utf-8"?>
+<file path=ppt/slides/slide6.xml><?xml version="1.0" encoding="utf-8"?>
 <p:sld xmlns:a="http://schemas.openxmlformats.org/drawingml/2006/main" xmlns:r="http://schemas.openxmlformats.org/officeDocument/2006/relationships" xmlns:p="http://schemas.openxmlformats.org/presentationml/2006/main">
   <p:cSld>
     <p:spTree>
@@ -11840,12 +12467,12 @@
           <a:lstStyle/>
           <a:p>
             <a:r>
-              <a:rPr lang="en-US">
+              <a:rPr lang="en-US" dirty="0">
                 <a:cs typeface="Calibri Light"/>
               </a:rPr>
-              <a:t>Calendar scenario</a:t>
-            </a:r>
-            <a:endParaRPr lang="en-US"/>
+              <a:t>Sample questions related to calendar service</a:t>
+            </a:r>
+            <a:endParaRPr lang="en-US" dirty="0"/>
           </a:p>
         </p:txBody>
       </p:sp>
@@ -11873,52 +12500,32 @@
           <a:lstStyle/>
           <a:p>
             <a:r>
-              <a:rPr lang="en-US">
-                <a:cs typeface="Calibri"/>
-              </a:rPr>
-              <a:t>Assume that suspect added an event along with the attendees for any date and added a reminder about that event</a:t>
-            </a:r>
-          </a:p>
-          <a:p>
-            <a:r>
-              <a:rPr lang="en-US">
-                <a:cs typeface="Calibri"/>
-              </a:rPr>
-              <a:t>Questions</a:t>
-            </a:r>
-          </a:p>
-          <a:p>
-            <a:pPr lvl="1"/>
-            <a:r>
-              <a:rPr lang="en-US">
+              <a:rPr lang="en-US" dirty="0">
                 <a:cs typeface="Calibri"/>
               </a:rPr>
               <a:t>What is the date of the scheduled event?</a:t>
             </a:r>
           </a:p>
           <a:p>
-            <a:pPr lvl="1"/>
-            <a:r>
-              <a:rPr lang="en-US">
+            <a:r>
+              <a:rPr lang="en-US" dirty="0">
                 <a:cs typeface="Calibri"/>
               </a:rPr>
               <a:t>Who are the attendees?</a:t>
             </a:r>
           </a:p>
           <a:p>
-            <a:pPr lvl="1"/>
-            <a:r>
-              <a:rPr lang="en-US">
+            <a:r>
+              <a:rPr lang="en-US" dirty="0">
                 <a:cs typeface="Calibri"/>
               </a:rPr>
               <a:t>For which date is the reminder set?</a:t>
             </a:r>
-            <a:endParaRPr lang="en-US"/>
-          </a:p>
-          <a:p>
-            <a:pPr lvl="1"/>
-            <a:r>
-              <a:rPr lang="en-US">
+            <a:endParaRPr lang="en-US" dirty="0"/>
+          </a:p>
+          <a:p>
+            <a:r>
+              <a:rPr lang="en-US" dirty="0">
                 <a:cs typeface="Calibri"/>
               </a:rPr>
               <a:t>Are there any other events saved by the suspect?</a:t>
@@ -11939,7 +12546,96 @@
 </p:sld>
 </file>
 
-<file path=ppt/slides/slide6.xml><?xml version="1.0" encoding="utf-8"?>
+<file path=ppt/slides/slide7.xml><?xml version="1.0" encoding="utf-8"?>
+<p:sld xmlns:a="http://schemas.openxmlformats.org/drawingml/2006/main" xmlns:r="http://schemas.openxmlformats.org/officeDocument/2006/relationships" xmlns:p="http://schemas.openxmlformats.org/presentationml/2006/main">
+  <p:cSld>
+    <p:spTree>
+      <p:nvGrpSpPr>
+        <p:cNvPr id="1" name="">
+          <a:extLst>
+            <a:ext uri="{FF2B5EF4-FFF2-40B4-BE49-F238E27FC236}">
+              <a16:creationId xmlns:a16="http://schemas.microsoft.com/office/drawing/2014/main" id="{AD6052B9-F946-9628-59DD-24CFB5F763C8}"/>
+            </a:ext>
+          </a:extLst>
+        </p:cNvPr>
+        <p:cNvGrpSpPr/>
+        <p:nvPr/>
+      </p:nvGrpSpPr>
+      <p:grpSpPr>
+        <a:xfrm>
+          <a:off x="0" y="0"/>
+          <a:ext cx="0" cy="0"/>
+          <a:chOff x="0" y="0"/>
+          <a:chExt cx="0" cy="0"/>
+        </a:xfrm>
+      </p:grpSpPr>
+      <p:sp>
+        <p:nvSpPr>
+          <p:cNvPr id="4" name="Title 3">
+            <a:extLst>
+              <a:ext uri="{FF2B5EF4-FFF2-40B4-BE49-F238E27FC236}">
+                <a16:creationId xmlns:a16="http://schemas.microsoft.com/office/drawing/2014/main" id="{95CE8EB6-B960-E4BF-E0D7-8ACA72A042AE}"/>
+              </a:ext>
+            </a:extLst>
+          </p:cNvPr>
+          <p:cNvSpPr>
+            <a:spLocks noGrp="1"/>
+          </p:cNvSpPr>
+          <p:nvPr>
+            <p:ph type="title"/>
+          </p:nvPr>
+        </p:nvSpPr>
+        <p:spPr/>
+        <p:txBody>
+          <a:bodyPr/>
+          <a:lstStyle/>
+          <a:p>
+            <a:r>
+              <a:rPr lang="en-US" dirty="0"/>
+              <a:t>Investigate calendar services</a:t>
+            </a:r>
+          </a:p>
+        </p:txBody>
+      </p:sp>
+      <p:sp>
+        <p:nvSpPr>
+          <p:cNvPr id="5" name="Text Placeholder 4">
+            <a:extLst>
+              <a:ext uri="{FF2B5EF4-FFF2-40B4-BE49-F238E27FC236}">
+                <a16:creationId xmlns:a16="http://schemas.microsoft.com/office/drawing/2014/main" id="{AE4400C6-4677-E259-34E6-749AC27239A4}"/>
+              </a:ext>
+            </a:extLst>
+          </p:cNvPr>
+          <p:cNvSpPr>
+            <a:spLocks noGrp="1"/>
+          </p:cNvSpPr>
+          <p:nvPr>
+            <p:ph type="body" idx="1"/>
+          </p:nvPr>
+        </p:nvSpPr>
+        <p:spPr/>
+        <p:txBody>
+          <a:bodyPr/>
+          <a:lstStyle/>
+          <a:p>
+            <a:endParaRPr lang="en-US"/>
+          </a:p>
+        </p:txBody>
+      </p:sp>
+    </p:spTree>
+    <p:extLst>
+      <p:ext uri="{BB962C8B-B14F-4D97-AF65-F5344CB8AC3E}">
+        <p14:creationId xmlns:p14="http://schemas.microsoft.com/office/powerpoint/2010/main" val="3110483315"/>
+      </p:ext>
+    </p:extLst>
+  </p:cSld>
+  <p:clrMapOvr>
+    <a:masterClrMapping/>
+  </p:clrMapOvr>
+</p:sld>
+</file>
+
+<file path=ppt/slides/slide8.xml><?xml version="1.0" encoding="utf-8"?>
 <p:sld xmlns:a="http://schemas.openxmlformats.org/drawingml/2006/main" xmlns:r="http://schemas.openxmlformats.org/officeDocument/2006/relationships" xmlns:p="http://schemas.openxmlformats.org/presentationml/2006/main">
   <p:cSld>
     <p:spTree>
@@ -12004,12 +12700,12 @@
           </a:lstStyle>
           <a:p>
             <a:r>
-              <a:rPr lang="en-US">
+              <a:rPr lang="en-US" dirty="0">
                 <a:cs typeface="Calibri Light"/>
               </a:rPr>
-              <a:t>Strategies to find the message evidence</a:t>
-            </a:r>
-            <a:endParaRPr lang="en-US"/>
+              <a:t>Investigation strategies</a:t>
+            </a:r>
+            <a:endParaRPr lang="en-US" dirty="0"/>
           </a:p>
         </p:txBody>
       </p:sp>
@@ -12206,18 +12902,18 @@
           </a:lstStyle>
           <a:p>
             <a:r>
-              <a:rPr lang="en-US"/>
+              <a:rPr lang="en-US" dirty="0"/>
               <a:t>Understand how events/reminders are stored in disks</a:t>
             </a:r>
           </a:p>
           <a:p>
             <a:pPr lvl="1"/>
             <a:r>
-              <a:rPr lang="en-US"/>
+              <a:rPr lang="en-US" dirty="0"/>
               <a:t>often organized and </a:t>
             </a:r>
             <a:r>
-              <a:rPr lang="en-US">
+              <a:rPr lang="en-US" dirty="0">
                 <a:ea typeface="+mn-lt"/>
                 <a:cs typeface="+mn-lt"/>
               </a:rPr>
@@ -12226,10 +12922,40 @@
           </a:p>
           <a:p>
             <a:r>
-              <a:rPr lang="en-US"/>
+              <a:rPr lang="en-US" dirty="0"/>
               <a:t>Steps</a:t>
             </a:r>
-            <a:endParaRPr lang="en-US">
+            <a:endParaRPr lang="en-US" dirty="0">
+              <a:cs typeface="Calibri"/>
+            </a:endParaRPr>
+          </a:p>
+          <a:p>
+            <a:pPr lvl="1"/>
+            <a:r>
+              <a:rPr lang="en-US" dirty="0"/>
+              <a:t>find potential locations of evidence, e.g., folder</a:t>
+            </a:r>
+            <a:endParaRPr lang="en-US" dirty="0">
+              <a:cs typeface="Calibri"/>
+            </a:endParaRPr>
+          </a:p>
+          <a:p>
+            <a:pPr lvl="1"/>
+            <a:r>
+              <a:rPr lang="en-US" dirty="0"/>
+              <a:t>find database/files</a:t>
+            </a:r>
+            <a:endParaRPr lang="en-US" dirty="0">
+              <a:cs typeface="Calibri"/>
+            </a:endParaRPr>
+          </a:p>
+          <a:p>
+            <a:pPr lvl="1"/>
+            <a:r>
+              <a:rPr lang="en-US" dirty="0"/>
+              <a:t>examine database/file</a:t>
+            </a:r>
+            <a:endParaRPr lang="en-US" dirty="0">
               <a:cs typeface="Calibri"/>
             </a:endParaRPr>
           </a:p>
@@ -12237,61 +12963,7 @@
             <a:pPr marL="457200" lvl="1" indent="0">
               <a:buNone/>
             </a:pPr>
-            <a:r>
-              <a:rPr lang="en-US"/>
-              <a:t>Remember the list of questions to be answered</a:t>
-            </a:r>
-          </a:p>
-          <a:p>
-            <a:pPr marL="457200" lvl="1" indent="0">
-              <a:buNone/>
-            </a:pPr>
-            <a:r>
-              <a:rPr lang="en-US"/>
-              <a:t>for each question, repeat</a:t>
-            </a:r>
-          </a:p>
-          <a:p>
-            <a:pPr marL="914400" lvl="1" indent="-457200">
-              <a:buAutoNum type="arabicPeriod"/>
-            </a:pPr>
-            <a:r>
-              <a:rPr lang="en-US"/>
-              <a:t>find potential locations of evidence, e.g., folder</a:t>
-            </a:r>
-            <a:endParaRPr lang="en-US">
-              <a:cs typeface="Calibri"/>
-            </a:endParaRPr>
-          </a:p>
-          <a:p>
-            <a:pPr marL="914400" lvl="1" indent="-457200">
-              <a:buAutoNum type="arabicPeriod"/>
-            </a:pPr>
-            <a:r>
-              <a:rPr lang="en-US"/>
-              <a:t>find database/files</a:t>
-            </a:r>
-            <a:endParaRPr lang="en-US">
-              <a:cs typeface="Calibri"/>
-            </a:endParaRPr>
-          </a:p>
-          <a:p>
-            <a:pPr marL="914400" lvl="1" indent="-457200">
-              <a:buAutoNum type="arabicPeriod"/>
-            </a:pPr>
-            <a:r>
-              <a:rPr lang="en-US"/>
-              <a:t>examine database/file</a:t>
-            </a:r>
-            <a:endParaRPr lang="en-US">
-              <a:cs typeface="Calibri"/>
-            </a:endParaRPr>
-          </a:p>
-          <a:p>
-            <a:pPr marL="457200" lvl="1" indent="0">
-              <a:buNone/>
-            </a:pPr>
-            <a:endParaRPr lang="en-US">
+            <a:endParaRPr lang="en-US" dirty="0">
               <a:cs typeface="Calibri"/>
             </a:endParaRPr>
           </a:p>
@@ -12299,13 +12971,13 @@
             <a:pPr marL="0" indent="0">
               <a:buNone/>
             </a:pPr>
-            <a:endParaRPr lang="en-US">
+            <a:endParaRPr lang="en-US" dirty="0">
               <a:cs typeface="Calibri"/>
             </a:endParaRPr>
           </a:p>
           <a:p>
             <a:pPr lvl="1"/>
-            <a:endParaRPr lang="en-US">
+            <a:endParaRPr lang="en-US" dirty="0">
               <a:cs typeface="Calibri"/>
             </a:endParaRPr>
           </a:p>
@@ -12324,7 +12996,7 @@
 </p:sld>
 </file>
 
-<file path=ppt/slides/slide7.xml><?xml version="1.0" encoding="utf-8"?>
+<file path=ppt/slides/slide9.xml><?xml version="1.0" encoding="utf-8"?>
 <p:sld xmlns:a="http://schemas.openxmlformats.org/drawingml/2006/main" xmlns:r="http://schemas.openxmlformats.org/officeDocument/2006/relationships" xmlns:p="http://schemas.openxmlformats.org/presentationml/2006/main">
   <p:cSld>
     <p:spTree>
@@ -12366,7 +13038,7 @@
               <a:rPr lang="en-US" dirty="0">
                 <a:cs typeface="Calibri Light"/>
               </a:rPr>
-              <a:t>Step 1: find the location of the evidence</a:t>
+              <a:t>Calendar services folder structure</a:t>
             </a:r>
             <a:endParaRPr lang="en-US" dirty="0"/>
           </a:p>
@@ -12458,523 +13130,6 @@
     <p:extLst>
       <p:ext uri="{BB962C8B-B14F-4D97-AF65-F5344CB8AC3E}">
         <p14:creationId xmlns:p14="http://schemas.microsoft.com/office/powerpoint/2010/main" val="1839150834"/>
-      </p:ext>
-    </p:extLst>
-  </p:cSld>
-  <p:clrMapOvr>
-    <a:masterClrMapping/>
-  </p:clrMapOvr>
-</p:sld>
-</file>
-
-<file path=ppt/slides/slide8.xml><?xml version="1.0" encoding="utf-8"?>
-<p:sld xmlns:a="http://schemas.openxmlformats.org/drawingml/2006/main" xmlns:r="http://schemas.openxmlformats.org/officeDocument/2006/relationships" xmlns:p="http://schemas.openxmlformats.org/presentationml/2006/main">
-  <p:cSld>
-    <p:spTree>
-      <p:nvGrpSpPr>
-        <p:cNvPr id="1" name=""/>
-        <p:cNvGrpSpPr/>
-        <p:nvPr/>
-      </p:nvGrpSpPr>
-      <p:grpSpPr>
-        <a:xfrm>
-          <a:off x="0" y="0"/>
-          <a:ext cx="0" cy="0"/>
-          <a:chOff x="0" y="0"/>
-          <a:chExt cx="0" cy="0"/>
-        </a:xfrm>
-      </p:grpSpPr>
-      <p:sp>
-        <p:nvSpPr>
-          <p:cNvPr id="2" name="Title 1">
-            <a:extLst>
-              <a:ext uri="{FF2B5EF4-FFF2-40B4-BE49-F238E27FC236}">
-                <a16:creationId xmlns:a16="http://schemas.microsoft.com/office/drawing/2014/main" id="{88A96AAE-54C7-4A67-B297-1D11C1D82726}"/>
-              </a:ext>
-            </a:extLst>
-          </p:cNvPr>
-          <p:cNvSpPr>
-            <a:spLocks noGrp="1"/>
-          </p:cNvSpPr>
-          <p:nvPr>
-            <p:ph type="title"/>
-          </p:nvPr>
-        </p:nvSpPr>
-        <p:spPr/>
-        <p:txBody>
-          <a:bodyPr/>
-          <a:lstStyle/>
-          <a:p>
-            <a:r>
-              <a:rPr lang="en-US" dirty="0">
-                <a:cs typeface="Calibri Light"/>
-              </a:rPr>
-              <a:t>Step 2: </a:t>
-            </a:r>
-            <a:r>
-              <a:rPr lang="en-US" dirty="0"/>
-              <a:t>Find the database</a:t>
-            </a:r>
-          </a:p>
-        </p:txBody>
-      </p:sp>
-      <p:pic>
-        <p:nvPicPr>
-          <p:cNvPr id="5" name="Picture 5" descr="A picture containing logo&#10;&#10;Description automatically generated">
-            <a:extLst>
-              <a:ext uri="{FF2B5EF4-FFF2-40B4-BE49-F238E27FC236}">
-                <a16:creationId xmlns:a16="http://schemas.microsoft.com/office/drawing/2014/main" id="{8AEDF05A-60F2-4524-8451-C5C728E103BB}"/>
-              </a:ext>
-            </a:extLst>
-          </p:cNvPr>
-          <p:cNvPicPr>
-            <a:picLocks noChangeAspect="1"/>
-          </p:cNvPicPr>
-          <p:nvPr/>
-        </p:nvPicPr>
-        <p:blipFill>
-          <a:blip r:embed="rId3"/>
-          <a:stretch>
-            <a:fillRect/>
-          </a:stretch>
-        </p:blipFill>
-        <p:spPr>
-          <a:xfrm>
-            <a:off x="838200" y="2467080"/>
-            <a:ext cx="10842365" cy="2273342"/>
-          </a:xfrm>
-          <a:prstGeom prst="rect">
-            <a:avLst/>
-          </a:prstGeom>
-        </p:spPr>
-      </p:pic>
-      <p:sp>
-        <p:nvSpPr>
-          <p:cNvPr id="6" name="Rectangle 5">
-            <a:extLst>
-              <a:ext uri="{FF2B5EF4-FFF2-40B4-BE49-F238E27FC236}">
-                <a16:creationId xmlns:a16="http://schemas.microsoft.com/office/drawing/2014/main" id="{383E0541-0D55-451D-AAD3-ADD4C9225F75}"/>
-              </a:ext>
-            </a:extLst>
-          </p:cNvPr>
-          <p:cNvSpPr/>
-          <p:nvPr/>
-        </p:nvSpPr>
-        <p:spPr>
-          <a:xfrm>
-            <a:off x="1498442" y="3025069"/>
-            <a:ext cx="10173367" cy="387684"/>
-          </a:xfrm>
-          <a:prstGeom prst="rect">
-            <a:avLst/>
-          </a:prstGeom>
-          <a:noFill/>
-          <a:ln w="28575">
-            <a:solidFill>
-              <a:srgbClr val="FF0000"/>
-            </a:solidFill>
-          </a:ln>
-        </p:spPr>
-        <p:style>
-          <a:lnRef idx="2">
-            <a:schemeClr val="accent1">
-              <a:shade val="50000"/>
-            </a:schemeClr>
-          </a:lnRef>
-          <a:fillRef idx="1">
-            <a:schemeClr val="accent1"/>
-          </a:fillRef>
-          <a:effectRef idx="0">
-            <a:schemeClr val="accent1"/>
-          </a:effectRef>
-          <a:fontRef idx="minor">
-            <a:schemeClr val="lt1"/>
-          </a:fontRef>
-        </p:style>
-        <p:txBody>
-          <a:bodyPr rtlCol="0" anchor="ctr"/>
-          <a:lstStyle/>
-          <a:p>
-            <a:pPr algn="ctr"/>
-            <a:endParaRPr lang="en-US"/>
-          </a:p>
-        </p:txBody>
-      </p:sp>
-    </p:spTree>
-    <p:extLst>
-      <p:ext uri="{BB962C8B-B14F-4D97-AF65-F5344CB8AC3E}">
-        <p14:creationId xmlns:p14="http://schemas.microsoft.com/office/powerpoint/2010/main" val="46822973"/>
-      </p:ext>
-    </p:extLst>
-  </p:cSld>
-  <p:clrMapOvr>
-    <a:masterClrMapping/>
-  </p:clrMapOvr>
-</p:sld>
-</file>
-
-<file path=ppt/slides/slide9.xml><?xml version="1.0" encoding="utf-8"?>
-<p:sld xmlns:a="http://schemas.openxmlformats.org/drawingml/2006/main" xmlns:r="http://schemas.openxmlformats.org/officeDocument/2006/relationships" xmlns:p="http://schemas.openxmlformats.org/presentationml/2006/main">
-  <p:cSld>
-    <p:spTree>
-      <p:nvGrpSpPr>
-        <p:cNvPr id="1" name=""/>
-        <p:cNvGrpSpPr/>
-        <p:nvPr/>
-      </p:nvGrpSpPr>
-      <p:grpSpPr>
-        <a:xfrm>
-          <a:off x="0" y="0"/>
-          <a:ext cx="0" cy="0"/>
-          <a:chOff x="0" y="0"/>
-          <a:chExt cx="0" cy="0"/>
-        </a:xfrm>
-      </p:grpSpPr>
-      <p:sp>
-        <p:nvSpPr>
-          <p:cNvPr id="2" name="Title 1">
-            <a:extLst>
-              <a:ext uri="{FF2B5EF4-FFF2-40B4-BE49-F238E27FC236}">
-                <a16:creationId xmlns:a16="http://schemas.microsoft.com/office/drawing/2014/main" id="{B23D5793-2D2E-4A05-BBDB-A78A693AE53B}"/>
-              </a:ext>
-            </a:extLst>
-          </p:cNvPr>
-          <p:cNvSpPr>
-            <a:spLocks noGrp="1"/>
-          </p:cNvSpPr>
-          <p:nvPr>
-            <p:ph type="title"/>
-          </p:nvPr>
-        </p:nvSpPr>
-        <p:spPr/>
-        <p:txBody>
-          <a:bodyPr/>
-          <a:lstStyle/>
-          <a:p>
-            <a:r>
-              <a:rPr lang="en-US">
-                <a:cs typeface="Calibri Light"/>
-              </a:rPr>
-              <a:t>Step 3: examine the database</a:t>
-            </a:r>
-            <a:endParaRPr lang="en-US"/>
-          </a:p>
-        </p:txBody>
-      </p:sp>
-      <p:pic>
-        <p:nvPicPr>
-          <p:cNvPr id="5" name="Picture 4" descr="Text&#10;&#10;Description automatically generated">
-            <a:extLst>
-              <a:ext uri="{FF2B5EF4-FFF2-40B4-BE49-F238E27FC236}">
-                <a16:creationId xmlns:a16="http://schemas.microsoft.com/office/drawing/2014/main" id="{49EA2546-C8EF-4AC8-8747-47AF64C5169C}"/>
-              </a:ext>
-            </a:extLst>
-          </p:cNvPr>
-          <p:cNvPicPr>
-            <a:picLocks noChangeAspect="1"/>
-          </p:cNvPicPr>
-          <p:nvPr/>
-        </p:nvPicPr>
-        <p:blipFill>
-          <a:blip r:embed="rId3"/>
-          <a:stretch>
-            <a:fillRect/>
-          </a:stretch>
-        </p:blipFill>
-        <p:spPr>
-          <a:xfrm>
-            <a:off x="839036" y="1881114"/>
-            <a:ext cx="10677568" cy="856114"/>
-          </a:xfrm>
-          <a:prstGeom prst="rect">
-            <a:avLst/>
-          </a:prstGeom>
-        </p:spPr>
-      </p:pic>
-      <p:pic>
-        <p:nvPicPr>
-          <p:cNvPr id="7" name="Picture 6" descr="Graphical user interface, text, application&#10;&#10;Description automatically generated">
-            <a:extLst>
-              <a:ext uri="{FF2B5EF4-FFF2-40B4-BE49-F238E27FC236}">
-                <a16:creationId xmlns:a16="http://schemas.microsoft.com/office/drawing/2014/main" id="{69CDA6A5-0B40-476D-8B25-8B1F60C519F9}"/>
-              </a:ext>
-            </a:extLst>
-          </p:cNvPr>
-          <p:cNvPicPr>
-            <a:picLocks noChangeAspect="1"/>
-          </p:cNvPicPr>
-          <p:nvPr/>
-        </p:nvPicPr>
-        <p:blipFill>
-          <a:blip r:embed="rId4"/>
-          <a:stretch>
-            <a:fillRect/>
-          </a:stretch>
-        </p:blipFill>
-        <p:spPr>
-          <a:xfrm>
-            <a:off x="5901488" y="3105085"/>
-            <a:ext cx="5650622" cy="3265503"/>
-          </a:xfrm>
-          <a:prstGeom prst="rect">
-            <a:avLst/>
-          </a:prstGeom>
-        </p:spPr>
-      </p:pic>
-      <p:sp>
-        <p:nvSpPr>
-          <p:cNvPr id="8" name="TextBox 7">
-            <a:extLst>
-              <a:ext uri="{FF2B5EF4-FFF2-40B4-BE49-F238E27FC236}">
-                <a16:creationId xmlns:a16="http://schemas.microsoft.com/office/drawing/2014/main" id="{44428CDD-ABDD-43D0-AC19-D3F74162BD84}"/>
-              </a:ext>
-            </a:extLst>
-          </p:cNvPr>
-          <p:cNvSpPr txBox="1"/>
-          <p:nvPr/>
-        </p:nvSpPr>
-        <p:spPr>
-          <a:xfrm>
-            <a:off x="838200" y="3107849"/>
-            <a:ext cx="4788568" cy="1938992"/>
-          </a:xfrm>
-          <a:prstGeom prst="rect">
-            <a:avLst/>
-          </a:prstGeom>
-          <a:noFill/>
-        </p:spPr>
-        <p:txBody>
-          <a:bodyPr rot="0" spcFirstLastPara="0" vertOverflow="overflow" horzOverflow="overflow" vert="horz" wrap="square" lIns="91440" tIns="45720" rIns="91440" bIns="45720" numCol="1" spcCol="0" rtlCol="0" fromWordArt="0" anchor="t" anchorCtr="0" forceAA="0" compatLnSpc="1">
-            <a:prstTxWarp prst="textNoShape">
-              <a:avLst/>
-            </a:prstTxWarp>
-            <a:spAutoFit/>
-          </a:bodyPr>
-          <a:lstStyle/>
-          <a:p>
-            <a:pPr marL="285750" indent="-285750">
-              <a:buFont typeface="Arial"/>
-              <a:buChar char="•"/>
-            </a:pPr>
-            <a:r>
-              <a:rPr lang="en-US" sz="2400" dirty="0">
-                <a:cs typeface="Calibri"/>
-              </a:rPr>
-              <a:t>Tables to focus on: attendees, events, reminders</a:t>
-            </a:r>
-          </a:p>
-          <a:p>
-            <a:pPr marL="285750" indent="-285750">
-              <a:buFont typeface="Arial"/>
-              <a:buChar char="•"/>
-            </a:pPr>
-            <a:endParaRPr lang="en-US" sz="2400" dirty="0">
-              <a:cs typeface="Calibri"/>
-            </a:endParaRPr>
-          </a:p>
-          <a:p>
-            <a:pPr marL="285750" indent="-285750">
-              <a:buFont typeface="Arial"/>
-              <a:buChar char="•"/>
-            </a:pPr>
-            <a:r>
-              <a:rPr lang="en-US" sz="2400" dirty="0">
-                <a:cs typeface="Calibri"/>
-              </a:rPr>
-              <a:t>In this case there isn't any data to look at in any of the tables</a:t>
-            </a:r>
-          </a:p>
-        </p:txBody>
-      </p:sp>
-      <p:sp>
-        <p:nvSpPr>
-          <p:cNvPr id="9" name="Rectangle 8">
-            <a:extLst>
-              <a:ext uri="{FF2B5EF4-FFF2-40B4-BE49-F238E27FC236}">
-                <a16:creationId xmlns:a16="http://schemas.microsoft.com/office/drawing/2014/main" id="{439BBE62-E442-49FE-A5A1-59F6D538371E}"/>
-              </a:ext>
-            </a:extLst>
-          </p:cNvPr>
-          <p:cNvSpPr/>
-          <p:nvPr/>
-        </p:nvSpPr>
-        <p:spPr>
-          <a:xfrm>
-            <a:off x="1298073" y="2331145"/>
-            <a:ext cx="10226841" cy="387683"/>
-          </a:xfrm>
-          <a:prstGeom prst="rect">
-            <a:avLst/>
-          </a:prstGeom>
-          <a:noFill/>
-          <a:ln w="28575">
-            <a:solidFill>
-              <a:srgbClr val="FF0000"/>
-            </a:solidFill>
-          </a:ln>
-        </p:spPr>
-        <p:style>
-          <a:lnRef idx="2">
-            <a:schemeClr val="accent1">
-              <a:shade val="50000"/>
-            </a:schemeClr>
-          </a:lnRef>
-          <a:fillRef idx="1">
-            <a:schemeClr val="accent1"/>
-          </a:fillRef>
-          <a:effectRef idx="0">
-            <a:schemeClr val="accent1"/>
-          </a:effectRef>
-          <a:fontRef idx="minor">
-            <a:schemeClr val="lt1"/>
-          </a:fontRef>
-        </p:style>
-        <p:txBody>
-          <a:bodyPr rtlCol="0" anchor="ctr"/>
-          <a:lstStyle/>
-          <a:p>
-            <a:pPr algn="ctr"/>
-            <a:endParaRPr lang="en-US"/>
-          </a:p>
-        </p:txBody>
-      </p:sp>
-      <p:sp>
-        <p:nvSpPr>
-          <p:cNvPr id="11" name="TextBox 1">
-            <a:extLst>
-              <a:ext uri="{FF2B5EF4-FFF2-40B4-BE49-F238E27FC236}">
-                <a16:creationId xmlns:a16="http://schemas.microsoft.com/office/drawing/2014/main" id="{D7049351-4E8A-4FBD-9C7D-8779B20AC091}"/>
-              </a:ext>
-            </a:extLst>
-          </p:cNvPr>
-          <p:cNvSpPr txBox="1"/>
-          <p:nvPr/>
-        </p:nvSpPr>
-        <p:spPr>
-          <a:xfrm>
-            <a:off x="5908896" y="2742083"/>
-            <a:ext cx="1902572" cy="369332"/>
-          </a:xfrm>
-          <a:prstGeom prst="rect">
-            <a:avLst/>
-          </a:prstGeom>
-          <a:solidFill>
-            <a:schemeClr val="accent4"/>
-          </a:solidFill>
-        </p:spPr>
-        <p:txBody>
-          <a:bodyPr wrap="none" lIns="91440" tIns="45720" rIns="91440" bIns="45720" rtlCol="0" anchor="t">
-            <a:spAutoFit/>
-          </a:bodyPr>
-          <a:lstStyle>
-            <a:defPPr>
-              <a:defRPr lang="en-US"/>
-            </a:defPPr>
-            <a:lvl1pPr marL="0" algn="l" defTabSz="914400" rtl="0" eaLnBrk="1" latinLnBrk="0" hangingPunct="1">
-              <a:defRPr sz="1800" kern="1200">
-                <a:solidFill>
-                  <a:schemeClr val="tx1"/>
-                </a:solidFill>
-                <a:latin typeface="+mn-lt"/>
-                <a:ea typeface="+mn-ea"/>
-                <a:cs typeface="+mn-cs"/>
-              </a:defRPr>
-            </a:lvl1pPr>
-            <a:lvl2pPr marL="457200" algn="l" defTabSz="914400" rtl="0" eaLnBrk="1" latinLnBrk="0" hangingPunct="1">
-              <a:defRPr sz="1800" kern="1200">
-                <a:solidFill>
-                  <a:schemeClr val="tx1"/>
-                </a:solidFill>
-                <a:latin typeface="+mn-lt"/>
-                <a:ea typeface="+mn-ea"/>
-                <a:cs typeface="+mn-cs"/>
-              </a:defRPr>
-            </a:lvl2pPr>
-            <a:lvl3pPr marL="914400" algn="l" defTabSz="914400" rtl="0" eaLnBrk="1" latinLnBrk="0" hangingPunct="1">
-              <a:defRPr sz="1800" kern="1200">
-                <a:solidFill>
-                  <a:schemeClr val="tx1"/>
-                </a:solidFill>
-                <a:latin typeface="+mn-lt"/>
-                <a:ea typeface="+mn-ea"/>
-                <a:cs typeface="+mn-cs"/>
-              </a:defRPr>
-            </a:lvl3pPr>
-            <a:lvl4pPr marL="1371600" algn="l" defTabSz="914400" rtl="0" eaLnBrk="1" latinLnBrk="0" hangingPunct="1">
-              <a:defRPr sz="1800" kern="1200">
-                <a:solidFill>
-                  <a:schemeClr val="tx1"/>
-                </a:solidFill>
-                <a:latin typeface="+mn-lt"/>
-                <a:ea typeface="+mn-ea"/>
-                <a:cs typeface="+mn-cs"/>
-              </a:defRPr>
-            </a:lvl4pPr>
-            <a:lvl5pPr marL="1828800" algn="l" defTabSz="914400" rtl="0" eaLnBrk="1" latinLnBrk="0" hangingPunct="1">
-              <a:defRPr sz="1800" kern="1200">
-                <a:solidFill>
-                  <a:schemeClr val="tx1"/>
-                </a:solidFill>
-                <a:latin typeface="+mn-lt"/>
-                <a:ea typeface="+mn-ea"/>
-                <a:cs typeface="+mn-cs"/>
-              </a:defRPr>
-            </a:lvl5pPr>
-            <a:lvl6pPr marL="2286000" algn="l" defTabSz="914400" rtl="0" eaLnBrk="1" latinLnBrk="0" hangingPunct="1">
-              <a:defRPr sz="1800" kern="1200">
-                <a:solidFill>
-                  <a:schemeClr val="tx1"/>
-                </a:solidFill>
-                <a:latin typeface="+mn-lt"/>
-                <a:ea typeface="+mn-ea"/>
-                <a:cs typeface="+mn-cs"/>
-              </a:defRPr>
-            </a:lvl6pPr>
-            <a:lvl7pPr marL="2743200" algn="l" defTabSz="914400" rtl="0" eaLnBrk="1" latinLnBrk="0" hangingPunct="1">
-              <a:defRPr sz="1800" kern="1200">
-                <a:solidFill>
-                  <a:schemeClr val="tx1"/>
-                </a:solidFill>
-                <a:latin typeface="+mn-lt"/>
-                <a:ea typeface="+mn-ea"/>
-                <a:cs typeface="+mn-cs"/>
-              </a:defRPr>
-            </a:lvl7pPr>
-            <a:lvl8pPr marL="3200400" algn="l" defTabSz="914400" rtl="0" eaLnBrk="1" latinLnBrk="0" hangingPunct="1">
-              <a:defRPr sz="1800" kern="1200">
-                <a:solidFill>
-                  <a:schemeClr val="tx1"/>
-                </a:solidFill>
-                <a:latin typeface="+mn-lt"/>
-                <a:ea typeface="+mn-ea"/>
-                <a:cs typeface="+mn-cs"/>
-              </a:defRPr>
-            </a:lvl8pPr>
-            <a:lvl9pPr marL="3657600" algn="l" defTabSz="914400" rtl="0" eaLnBrk="1" latinLnBrk="0" hangingPunct="1">
-              <a:defRPr sz="1800" kern="1200">
-                <a:solidFill>
-                  <a:schemeClr val="tx1"/>
-                </a:solidFill>
-                <a:latin typeface="+mn-lt"/>
-                <a:ea typeface="+mn-ea"/>
-                <a:cs typeface="+mn-cs"/>
-              </a:defRPr>
-            </a:lvl9pPr>
-          </a:lstStyle>
-          <a:p>
-            <a:r>
-              <a:rPr lang="en-US">
-                <a:cs typeface="Calibri"/>
-              </a:rPr>
-              <a:t>Tables in database</a:t>
-            </a:r>
-          </a:p>
-        </p:txBody>
-      </p:sp>
-    </p:spTree>
-    <p:extLst>
-      <p:ext uri="{BB962C8B-B14F-4D97-AF65-F5344CB8AC3E}">
-        <p14:creationId xmlns:p14="http://schemas.microsoft.com/office/powerpoint/2010/main" val="3735861723"/>
       </p:ext>
     </p:extLst>
   </p:cSld>

</xml_diff>

<commit_message>
improve ASOP and GMS Dialer
</commit_message>
<xml_diff>
--- a/Android10/5_1_3_AOSP_App_Investigations_Calendar.pptx
+++ b/Android10/5_1_3_AOSP_App_Investigations_Calendar.pptx
@@ -5,27 +5,26 @@
     <p:sldMasterId id="2147483648" r:id="rId1"/>
   </p:sldMasterIdLst>
   <p:notesMasterIdLst>
-    <p:notesMasterId r:id="rId20"/>
+    <p:notesMasterId r:id="rId19"/>
   </p:notesMasterIdLst>
   <p:sldIdLst>
     <p:sldId id="256" r:id="rId2"/>
     <p:sldId id="504" r:id="rId3"/>
     <p:sldId id="408" r:id="rId4"/>
     <p:sldId id="451" r:id="rId5"/>
-    <p:sldId id="457" r:id="rId6"/>
-    <p:sldId id="448" r:id="rId7"/>
-    <p:sldId id="505" r:id="rId8"/>
-    <p:sldId id="497" r:id="rId9"/>
-    <p:sldId id="410" r:id="rId10"/>
-    <p:sldId id="411" r:id="rId11"/>
-    <p:sldId id="412" r:id="rId12"/>
-    <p:sldId id="498" r:id="rId13"/>
-    <p:sldId id="499" r:id="rId14"/>
-    <p:sldId id="500" r:id="rId15"/>
-    <p:sldId id="501" r:id="rId16"/>
-    <p:sldId id="502" r:id="rId17"/>
-    <p:sldId id="503" r:id="rId18"/>
-    <p:sldId id="449" r:id="rId19"/>
+    <p:sldId id="448" r:id="rId6"/>
+    <p:sldId id="505" r:id="rId7"/>
+    <p:sldId id="497" r:id="rId8"/>
+    <p:sldId id="410" r:id="rId9"/>
+    <p:sldId id="411" r:id="rId10"/>
+    <p:sldId id="412" r:id="rId11"/>
+    <p:sldId id="498" r:id="rId12"/>
+    <p:sldId id="499" r:id="rId13"/>
+    <p:sldId id="500" r:id="rId14"/>
+    <p:sldId id="501" r:id="rId15"/>
+    <p:sldId id="502" r:id="rId16"/>
+    <p:sldId id="503" r:id="rId17"/>
+    <p:sldId id="449" r:id="rId18"/>
   </p:sldIdLst>
   <p:sldSz cx="12192000" cy="6858000"/>
   <p:notesSz cx="6858000" cy="9144000"/>
@@ -147,7 +146,7 @@
 <file path=ppt/revisionInfo.xml><?xml version="1.0" encoding="utf-8"?>
 <p1510:revInfo xmlns:a="http://schemas.openxmlformats.org/drawingml/2006/main" xmlns:r="http://schemas.openxmlformats.org/officeDocument/2006/relationships" xmlns:p1510="http://schemas.microsoft.com/office/powerpoint/2015/10/main">
   <p1510:revLst>
-    <p1510:client id="{519CFF70-A104-4BE5-B7AF-E221F0BC4D16}" v="4" dt="2025-04-07T17:17:21.523"/>
+    <p1510:client id="{519CFF70-A104-4BE5-B7AF-E221F0BC4D16}" v="6" dt="2025-04-15T13:14:41.059"/>
   </p1510:revLst>
 </p1510:revInfo>
 </file>
@@ -4482,7 +4481,7 @@
   <pc:docChgLst>
     <pc:chgData name="Weifeng Xu" userId="e7aed605-a3dd-4d5a-a692-a87037af107b" providerId="ADAL" clId="{519CFF70-A104-4BE5-B7AF-E221F0BC4D16}"/>
     <pc:docChg chg="undo custSel addSld delSld modSld">
-      <pc:chgData name="Weifeng Xu" userId="e7aed605-a3dd-4d5a-a692-a87037af107b" providerId="ADAL" clId="{519CFF70-A104-4BE5-B7AF-E221F0BC4D16}" dt="2025-04-07T17:22:03.229" v="443" actId="47"/>
+      <pc:chgData name="Weifeng Xu" userId="e7aed605-a3dd-4d5a-a692-a87037af107b" providerId="ADAL" clId="{519CFF70-A104-4BE5-B7AF-E221F0BC4D16}" dt="2025-04-15T13:22:23.986" v="711" actId="47"/>
       <pc:docMkLst>
         <pc:docMk/>
       </pc:docMkLst>
@@ -4614,20 +4613,44 @@
           <pc:sldMk cId="1982119232" sldId="405"/>
         </pc:sldMkLst>
       </pc:sldChg>
-      <pc:sldChg chg="modSp mod">
-        <pc:chgData name="Weifeng Xu" userId="e7aed605-a3dd-4d5a-a692-a87037af107b" providerId="ADAL" clId="{519CFF70-A104-4BE5-B7AF-E221F0BC4D16}" dt="2025-04-07T17:14:42.311" v="250" actId="207"/>
+      <pc:sldChg chg="addSp delSp modSp mod">
+        <pc:chgData name="Weifeng Xu" userId="e7aed605-a3dd-4d5a-a692-a87037af107b" providerId="ADAL" clId="{519CFF70-A104-4BE5-B7AF-E221F0BC4D16}" dt="2025-04-15T13:21:12.062" v="693" actId="20577"/>
         <pc:sldMkLst>
           <pc:docMk/>
           <pc:sldMk cId="2622453785" sldId="408"/>
         </pc:sldMkLst>
         <pc:spChg chg="mod">
-          <ac:chgData name="Weifeng Xu" userId="e7aed605-a3dd-4d5a-a692-a87037af107b" providerId="ADAL" clId="{519CFF70-A104-4BE5-B7AF-E221F0BC4D16}" dt="2025-04-07T17:14:42.311" v="250" actId="207"/>
+          <ac:chgData name="Weifeng Xu" userId="e7aed605-a3dd-4d5a-a692-a87037af107b" providerId="ADAL" clId="{519CFF70-A104-4BE5-B7AF-E221F0BC4D16}" dt="2025-04-15T13:21:12.062" v="693" actId="20577"/>
           <ac:spMkLst>
             <pc:docMk/>
             <pc:sldMk cId="2622453785" sldId="408"/>
             <ac:spMk id="3" creationId="{9E0091E6-6379-4EE0-84A0-9638938021AE}"/>
           </ac:spMkLst>
         </pc:spChg>
+        <pc:picChg chg="add del">
+          <ac:chgData name="Weifeng Xu" userId="e7aed605-a3dd-4d5a-a692-a87037af107b" providerId="ADAL" clId="{519CFF70-A104-4BE5-B7AF-E221F0BC4D16}" dt="2025-04-15T13:14:40.428" v="538" actId="478"/>
+          <ac:picMkLst>
+            <pc:docMk/>
+            <pc:sldMk cId="2622453785" sldId="408"/>
+            <ac:picMk id="5" creationId="{0C66F263-15E6-4668-A5DE-9BE7BC0A153D}"/>
+          </ac:picMkLst>
+        </pc:picChg>
+        <pc:picChg chg="add del">
+          <ac:chgData name="Weifeng Xu" userId="e7aed605-a3dd-4d5a-a692-a87037af107b" providerId="ADAL" clId="{519CFF70-A104-4BE5-B7AF-E221F0BC4D16}" dt="2025-04-15T13:14:39.962" v="537" actId="478"/>
+          <ac:picMkLst>
+            <pc:docMk/>
+            <pc:sldMk cId="2622453785" sldId="408"/>
+            <ac:picMk id="8" creationId="{403916EE-9787-4760-A9E8-7E8E3D894E40}"/>
+          </ac:picMkLst>
+        </pc:picChg>
+        <pc:picChg chg="add del">
+          <ac:chgData name="Weifeng Xu" userId="e7aed605-a3dd-4d5a-a692-a87037af107b" providerId="ADAL" clId="{519CFF70-A104-4BE5-B7AF-E221F0BC4D16}" dt="2025-04-15T13:14:39.794" v="536" actId="478"/>
+          <ac:picMkLst>
+            <pc:docMk/>
+            <pc:sldMk cId="2622453785" sldId="408"/>
+            <ac:picMk id="9" creationId="{5E72BA32-CB2F-490B-AFFC-95D2E5F2E4CF}"/>
+          </ac:picMkLst>
+        </pc:picChg>
       </pc:sldChg>
       <pc:sldChg chg="add del">
         <pc:chgData name="Weifeng Xu" userId="e7aed605-a3dd-4d5a-a692-a87037af107b" providerId="ADAL" clId="{519CFF70-A104-4BE5-B7AF-E221F0BC4D16}" dt="2021-08-09T01:43:42.601" v="159" actId="47"/>
@@ -4876,12 +4899,36 @@
           </ac:spMkLst>
         </pc:spChg>
       </pc:sldChg>
-      <pc:sldChg chg="modSp mod">
-        <pc:chgData name="Weifeng Xu" userId="e7aed605-a3dd-4d5a-a692-a87037af107b" providerId="ADAL" clId="{519CFF70-A104-4BE5-B7AF-E221F0BC4D16}" dt="2021-08-09T01:42:12.191" v="154" actId="313"/>
+      <pc:sldChg chg="addSp modSp mod">
+        <pc:chgData name="Weifeng Xu" userId="e7aed605-a3dd-4d5a-a692-a87037af107b" providerId="ADAL" clId="{519CFF70-A104-4BE5-B7AF-E221F0BC4D16}" dt="2025-04-15T13:22:19.475" v="710" actId="1076"/>
         <pc:sldMkLst>
           <pc:docMk/>
           <pc:sldMk cId="1438349411" sldId="451"/>
         </pc:sldMkLst>
+        <pc:spChg chg="mod">
+          <ac:chgData name="Weifeng Xu" userId="e7aed605-a3dd-4d5a-a692-a87037af107b" providerId="ADAL" clId="{519CFF70-A104-4BE5-B7AF-E221F0BC4D16}" dt="2025-04-15T13:07:57.874" v="529" actId="20577"/>
+          <ac:spMkLst>
+            <pc:docMk/>
+            <pc:sldMk cId="1438349411" sldId="451"/>
+            <ac:spMk id="2" creationId="{80231DEC-AE3F-4F7E-97CF-CE153A54A91D}"/>
+          </ac:spMkLst>
+        </pc:spChg>
+        <pc:spChg chg="mod">
+          <ac:chgData name="Weifeng Xu" userId="e7aed605-a3dd-4d5a-a692-a87037af107b" providerId="ADAL" clId="{519CFF70-A104-4BE5-B7AF-E221F0BC4D16}" dt="2025-04-15T13:22:08.321" v="705" actId="14100"/>
+          <ac:spMkLst>
+            <pc:docMk/>
+            <pc:sldMk cId="1438349411" sldId="451"/>
+            <ac:spMk id="3" creationId="{2E61DE7B-70F3-4369-A340-1805DD534406}"/>
+          </ac:spMkLst>
+        </pc:spChg>
+        <pc:spChg chg="add mod">
+          <ac:chgData name="Weifeng Xu" userId="e7aed605-a3dd-4d5a-a692-a87037af107b" providerId="ADAL" clId="{519CFF70-A104-4BE5-B7AF-E221F0BC4D16}" dt="2025-04-15T13:22:19.475" v="710" actId="1076"/>
+          <ac:spMkLst>
+            <pc:docMk/>
+            <pc:sldMk cId="1438349411" sldId="451"/>
+            <ac:spMk id="5" creationId="{2A32B6A4-B984-E24B-0CDF-F362860B59D8}"/>
+          </ac:spMkLst>
+        </pc:spChg>
       </pc:sldChg>
       <pc:sldChg chg="del">
         <pc:chgData name="Weifeng Xu" userId="e7aed605-a3dd-4d5a-a692-a87037af107b" providerId="ADAL" clId="{519CFF70-A104-4BE5-B7AF-E221F0BC4D16}" dt="2021-08-09T01:38:45.491" v="79" actId="47"/>
@@ -4909,6 +4956,13 @@
         <pc:sldMkLst>
           <pc:docMk/>
           <pc:sldMk cId="819406772" sldId="456"/>
+        </pc:sldMkLst>
+      </pc:sldChg>
+      <pc:sldChg chg="del">
+        <pc:chgData name="Weifeng Xu" userId="e7aed605-a3dd-4d5a-a692-a87037af107b" providerId="ADAL" clId="{519CFF70-A104-4BE5-B7AF-E221F0BC4D16}" dt="2025-04-15T13:22:23.986" v="711" actId="47"/>
+        <pc:sldMkLst>
+          <pc:docMk/>
+          <pc:sldMk cId="1981201839" sldId="457"/>
         </pc:sldMkLst>
       </pc:sldChg>
       <pc:sldChg chg="del">
@@ -5291,22 +5345,6 @@
           <pc:docMk/>
           <pc:sldMk cId="1036379805" sldId="504"/>
         </pc:sldMkLst>
-        <pc:spChg chg="del mod ord">
-          <ac:chgData name="Weifeng Xu" userId="e7aed605-a3dd-4d5a-a692-a87037af107b" providerId="ADAL" clId="{519CFF70-A104-4BE5-B7AF-E221F0BC4D16}" dt="2025-04-07T17:15:45.051" v="252" actId="700"/>
-          <ac:spMkLst>
-            <pc:docMk/>
-            <pc:sldMk cId="1036379805" sldId="504"/>
-            <ac:spMk id="2" creationId="{74D42336-F3D6-2857-F7AD-9456D4C79B7B}"/>
-          </ac:spMkLst>
-        </pc:spChg>
-        <pc:spChg chg="del mod ord">
-          <ac:chgData name="Weifeng Xu" userId="e7aed605-a3dd-4d5a-a692-a87037af107b" providerId="ADAL" clId="{519CFF70-A104-4BE5-B7AF-E221F0BC4D16}" dt="2025-04-07T17:15:45.051" v="252" actId="700"/>
-          <ac:spMkLst>
-            <pc:docMk/>
-            <pc:sldMk cId="1036379805" sldId="504"/>
-            <ac:spMk id="3" creationId="{6615F10D-8F50-DF9F-3313-194A40EF085A}"/>
-          </ac:spMkLst>
-        </pc:spChg>
         <pc:spChg chg="add mod ord">
           <ac:chgData name="Weifeng Xu" userId="e7aed605-a3dd-4d5a-a692-a87037af107b" providerId="ADAL" clId="{519CFF70-A104-4BE5-B7AF-E221F0BC4D16}" dt="2025-04-07T17:15:56.595" v="257" actId="20577"/>
           <ac:spMkLst>
@@ -5338,6 +5376,13 @@
             <ac:spMk id="4" creationId="{95CE8EB6-B960-E4BF-E0D7-8ACA72A042AE}"/>
           </ac:spMkLst>
         </pc:spChg>
+      </pc:sldChg>
+      <pc:sldChg chg="add del">
+        <pc:chgData name="Weifeng Xu" userId="e7aed605-a3dd-4d5a-a692-a87037af107b" providerId="ADAL" clId="{519CFF70-A104-4BE5-B7AF-E221F0BC4D16}" dt="2025-04-15T13:14:41.058" v="539"/>
+        <pc:sldMkLst>
+          <pc:docMk/>
+          <pc:sldMk cId="3340538059" sldId="506"/>
+        </pc:sldMkLst>
       </pc:sldChg>
     </pc:docChg>
   </pc:docChgLst>
@@ -6749,7 +6794,7 @@
           <a:p>
             <a:fld id="{EE41F6E3-57F9-402E-BDBA-5B2DE11C8530}" type="datetimeFigureOut">
               <a:rPr lang="en-US" smtClean="0"/>
-              <a:t>4/7/2025</a:t>
+              <a:t>4/15/2025</a:t>
             </a:fld>
             <a:endParaRPr lang="en-US"/>
           </a:p>
@@ -7173,7 +7218,7 @@
           <a:p>
             <a:fld id="{DDBF98C7-164A-4723-84F0-B1E4B080DDEC}" type="slidenum">
               <a:rPr lang="en-US" smtClean="0"/>
-              <a:t>9</a:t>
+              <a:t>8</a:t>
             </a:fld>
             <a:endParaRPr lang="en-US"/>
           </a:p>
@@ -7280,7 +7325,7 @@
           <a:p>
             <a:fld id="{DDBF98C7-164A-4723-84F0-B1E4B080DDEC}" type="slidenum">
               <a:rPr lang="en-US" smtClean="0"/>
-              <a:t>10</a:t>
+              <a:t>9</a:t>
             </a:fld>
             <a:endParaRPr lang="en-US"/>
           </a:p>
@@ -7369,7 +7414,7 @@
           <a:p>
             <a:fld id="{DDBF98C7-164A-4723-84F0-B1E4B080DDEC}" type="slidenum">
               <a:rPr lang="en-US" smtClean="0"/>
-              <a:t>11</a:t>
+              <a:t>10</a:t>
             </a:fld>
             <a:endParaRPr lang="en-US"/>
           </a:p>
@@ -7517,7 +7562,7 @@
           <a:p>
             <a:fld id="{4263717A-E3C1-4BED-ABE0-B7069385E023}" type="datetimeFigureOut">
               <a:rPr lang="en-US" smtClean="0"/>
-              <a:t>4/7/2025</a:t>
+              <a:t>4/15/2025</a:t>
             </a:fld>
             <a:endParaRPr lang="en-US"/>
           </a:p>
@@ -7690,7 +7735,7 @@
           <a:p>
             <a:fld id="{4263717A-E3C1-4BED-ABE0-B7069385E023}" type="datetimeFigureOut">
               <a:rPr lang="en-US" smtClean="0"/>
-              <a:t>4/7/2025</a:t>
+              <a:t>4/15/2025</a:t>
             </a:fld>
             <a:endParaRPr lang="en-US"/>
           </a:p>
@@ -7868,7 +7913,7 @@
           <a:p>
             <a:fld id="{4263717A-E3C1-4BED-ABE0-B7069385E023}" type="datetimeFigureOut">
               <a:rPr lang="en-US" smtClean="0"/>
-              <a:t>4/7/2025</a:t>
+              <a:t>4/15/2025</a:t>
             </a:fld>
             <a:endParaRPr lang="en-US"/>
           </a:p>
@@ -8036,7 +8081,7 @@
           <a:p>
             <a:fld id="{4263717A-E3C1-4BED-ABE0-B7069385E023}" type="datetimeFigureOut">
               <a:rPr lang="en-US" smtClean="0"/>
-              <a:t>4/7/2025</a:t>
+              <a:t>4/15/2025</a:t>
             </a:fld>
             <a:endParaRPr lang="en-US"/>
           </a:p>
@@ -8281,7 +8326,7 @@
           <a:p>
             <a:fld id="{4263717A-E3C1-4BED-ABE0-B7069385E023}" type="datetimeFigureOut">
               <a:rPr lang="en-US" smtClean="0"/>
-              <a:t>4/7/2025</a:t>
+              <a:t>4/15/2025</a:t>
             </a:fld>
             <a:endParaRPr lang="en-US"/>
           </a:p>
@@ -8510,7 +8555,7 @@
           <a:p>
             <a:fld id="{4263717A-E3C1-4BED-ABE0-B7069385E023}" type="datetimeFigureOut">
               <a:rPr lang="en-US" smtClean="0"/>
-              <a:t>4/7/2025</a:t>
+              <a:t>4/15/2025</a:t>
             </a:fld>
             <a:endParaRPr lang="en-US"/>
           </a:p>
@@ -8874,7 +8919,7 @@
           <a:p>
             <a:fld id="{4263717A-E3C1-4BED-ABE0-B7069385E023}" type="datetimeFigureOut">
               <a:rPr lang="en-US" smtClean="0"/>
-              <a:t>4/7/2025</a:t>
+              <a:t>4/15/2025</a:t>
             </a:fld>
             <a:endParaRPr lang="en-US"/>
           </a:p>
@@ -8991,7 +9036,7 @@
           <a:p>
             <a:fld id="{4263717A-E3C1-4BED-ABE0-B7069385E023}" type="datetimeFigureOut">
               <a:rPr lang="en-US" smtClean="0"/>
-              <a:t>4/7/2025</a:t>
+              <a:t>4/15/2025</a:t>
             </a:fld>
             <a:endParaRPr lang="en-US"/>
           </a:p>
@@ -9086,7 +9131,7 @@
           <a:p>
             <a:fld id="{4263717A-E3C1-4BED-ABE0-B7069385E023}" type="datetimeFigureOut">
               <a:rPr lang="en-US" smtClean="0"/>
-              <a:t>4/7/2025</a:t>
+              <a:t>4/15/2025</a:t>
             </a:fld>
             <a:endParaRPr lang="en-US"/>
           </a:p>
@@ -9361,7 +9406,7 @@
           <a:p>
             <a:fld id="{4263717A-E3C1-4BED-ABE0-B7069385E023}" type="datetimeFigureOut">
               <a:rPr lang="en-US" smtClean="0"/>
-              <a:t>4/7/2025</a:t>
+              <a:t>4/15/2025</a:t>
             </a:fld>
             <a:endParaRPr lang="en-US"/>
           </a:p>
@@ -9613,7 +9658,7 @@
           <a:p>
             <a:fld id="{4263717A-E3C1-4BED-ABE0-B7069385E023}" type="datetimeFigureOut">
               <a:rPr lang="en-US" smtClean="0"/>
-              <a:t>4/7/2025</a:t>
+              <a:t>4/15/2025</a:t>
             </a:fld>
             <a:endParaRPr lang="en-US"/>
           </a:p>
@@ -9824,7 +9869,7 @@
           <a:p>
             <a:fld id="{4263717A-E3C1-4BED-ABE0-B7069385E023}" type="datetimeFigureOut">
               <a:rPr lang="en-US" smtClean="0"/>
-              <a:t>4/7/2025</a:t>
+              <a:t>4/15/2025</a:t>
             </a:fld>
             <a:endParaRPr lang="en-US"/>
           </a:p>
@@ -10489,180 +10534,6 @@
           <p:cNvPr id="2" name="Title 1">
             <a:extLst>
               <a:ext uri="{FF2B5EF4-FFF2-40B4-BE49-F238E27FC236}">
-                <a16:creationId xmlns:a16="http://schemas.microsoft.com/office/drawing/2014/main" id="{88A96AAE-54C7-4A67-B297-1D11C1D82726}"/>
-              </a:ext>
-            </a:extLst>
-          </p:cNvPr>
-          <p:cNvSpPr>
-            <a:spLocks noGrp="1"/>
-          </p:cNvSpPr>
-          <p:nvPr>
-            <p:ph type="title"/>
-          </p:nvPr>
-        </p:nvSpPr>
-        <p:spPr/>
-        <p:txBody>
-          <a:bodyPr/>
-          <a:lstStyle/>
-          <a:p>
-            <a:r>
-              <a:rPr lang="en-US" dirty="0" err="1">
-                <a:solidFill>
-                  <a:schemeClr val="accent2"/>
-                </a:solidFill>
-                <a:cs typeface="Calibri Light"/>
-              </a:rPr>
-              <a:t>calendar.db</a:t>
-            </a:r>
-            <a:r>
-              <a:rPr lang="en-US" dirty="0">
-                <a:solidFill>
-                  <a:schemeClr val="accent2"/>
-                </a:solidFill>
-                <a:cs typeface="Calibri Light"/>
-              </a:rPr>
-              <a:t> </a:t>
-            </a:r>
-            <a:r>
-              <a:rPr lang="en-US" dirty="0">
-                <a:cs typeface="Calibri Light"/>
-              </a:rPr>
-              <a:t>location</a:t>
-            </a:r>
-            <a:r>
-              <a:rPr lang="en-US" dirty="0">
-                <a:solidFill>
-                  <a:schemeClr val="accent2"/>
-                </a:solidFill>
-                <a:cs typeface="Calibri Light"/>
-              </a:rPr>
-              <a:t> </a:t>
-            </a:r>
-            <a:endParaRPr lang="en-US" dirty="0">
-              <a:solidFill>
-                <a:schemeClr val="accent2"/>
-              </a:solidFill>
-            </a:endParaRPr>
-          </a:p>
-        </p:txBody>
-      </p:sp>
-      <p:pic>
-        <p:nvPicPr>
-          <p:cNvPr id="5" name="Picture 5" descr="A picture containing logo&#10;&#10;Description automatically generated">
-            <a:extLst>
-              <a:ext uri="{FF2B5EF4-FFF2-40B4-BE49-F238E27FC236}">
-                <a16:creationId xmlns:a16="http://schemas.microsoft.com/office/drawing/2014/main" id="{8AEDF05A-60F2-4524-8451-C5C728E103BB}"/>
-              </a:ext>
-            </a:extLst>
-          </p:cNvPr>
-          <p:cNvPicPr>
-            <a:picLocks noChangeAspect="1"/>
-          </p:cNvPicPr>
-          <p:nvPr/>
-        </p:nvPicPr>
-        <p:blipFill>
-          <a:blip r:embed="rId3"/>
-          <a:stretch>
-            <a:fillRect/>
-          </a:stretch>
-        </p:blipFill>
-        <p:spPr>
-          <a:xfrm>
-            <a:off x="838200" y="2467080"/>
-            <a:ext cx="10233837" cy="2145751"/>
-          </a:xfrm>
-          <a:prstGeom prst="rect">
-            <a:avLst/>
-          </a:prstGeom>
-        </p:spPr>
-      </p:pic>
-      <p:sp>
-        <p:nvSpPr>
-          <p:cNvPr id="6" name="Rectangle 5">
-            <a:extLst>
-              <a:ext uri="{FF2B5EF4-FFF2-40B4-BE49-F238E27FC236}">
-                <a16:creationId xmlns:a16="http://schemas.microsoft.com/office/drawing/2014/main" id="{383E0541-0D55-451D-AAD3-ADD4C9225F75}"/>
-              </a:ext>
-            </a:extLst>
-          </p:cNvPr>
-          <p:cNvSpPr/>
-          <p:nvPr/>
-        </p:nvSpPr>
-        <p:spPr>
-          <a:xfrm>
-            <a:off x="1498442" y="3025069"/>
-            <a:ext cx="9502711" cy="313554"/>
-          </a:xfrm>
-          <a:prstGeom prst="rect">
-            <a:avLst/>
-          </a:prstGeom>
-          <a:noFill/>
-          <a:ln w="28575">
-            <a:solidFill>
-              <a:srgbClr val="FF0000"/>
-            </a:solidFill>
-          </a:ln>
-        </p:spPr>
-        <p:style>
-          <a:lnRef idx="2">
-            <a:schemeClr val="accent1">
-              <a:shade val="50000"/>
-            </a:schemeClr>
-          </a:lnRef>
-          <a:fillRef idx="1">
-            <a:schemeClr val="accent1"/>
-          </a:fillRef>
-          <a:effectRef idx="0">
-            <a:schemeClr val="accent1"/>
-          </a:effectRef>
-          <a:fontRef idx="minor">
-            <a:schemeClr val="lt1"/>
-          </a:fontRef>
-        </p:style>
-        <p:txBody>
-          <a:bodyPr rtlCol="0" anchor="ctr"/>
-          <a:lstStyle/>
-          <a:p>
-            <a:pPr algn="ctr"/>
-            <a:endParaRPr lang="en-US"/>
-          </a:p>
-        </p:txBody>
-      </p:sp>
-    </p:spTree>
-    <p:extLst>
-      <p:ext uri="{BB962C8B-B14F-4D97-AF65-F5344CB8AC3E}">
-        <p14:creationId xmlns:p14="http://schemas.microsoft.com/office/powerpoint/2010/main" val="46822973"/>
-      </p:ext>
-    </p:extLst>
-  </p:cSld>
-  <p:clrMapOvr>
-    <a:masterClrMapping/>
-  </p:clrMapOvr>
-</p:sld>
-</file>
-
-<file path=ppt/slides/slide11.xml><?xml version="1.0" encoding="utf-8"?>
-<p:sld xmlns:a="http://schemas.openxmlformats.org/drawingml/2006/main" xmlns:r="http://schemas.openxmlformats.org/officeDocument/2006/relationships" xmlns:p="http://schemas.openxmlformats.org/presentationml/2006/main">
-  <p:cSld>
-    <p:spTree>
-      <p:nvGrpSpPr>
-        <p:cNvPr id="1" name=""/>
-        <p:cNvGrpSpPr/>
-        <p:nvPr/>
-      </p:nvGrpSpPr>
-      <p:grpSpPr>
-        <a:xfrm>
-          <a:off x="0" y="0"/>
-          <a:ext cx="0" cy="0"/>
-          <a:chOff x="0" y="0"/>
-          <a:chExt cx="0" cy="0"/>
-        </a:xfrm>
-      </p:grpSpPr>
-      <p:sp>
-        <p:nvSpPr>
-          <p:cNvPr id="2" name="Title 1">
-            <a:extLst>
-              <a:ext uri="{FF2B5EF4-FFF2-40B4-BE49-F238E27FC236}">
                 <a16:creationId xmlns:a16="http://schemas.microsoft.com/office/drawing/2014/main" id="{B23D5793-2D2E-4A05-BBDB-A78A693AE53B}"/>
               </a:ext>
             </a:extLst>
@@ -11030,7 +10901,7 @@
 </p:sld>
 </file>
 
-<file path=ppt/slides/slide12.xml><?xml version="1.0" encoding="utf-8"?>
+<file path=ppt/slides/slide11.xml><?xml version="1.0" encoding="utf-8"?>
 <p:sld xmlns:a="http://schemas.openxmlformats.org/drawingml/2006/main" xmlns:r="http://schemas.openxmlformats.org/officeDocument/2006/relationships" xmlns:p="http://schemas.openxmlformats.org/presentationml/2006/main">
   <p:cSld>
     <p:spTree>
@@ -11274,7 +11145,7 @@
 </p:sld>
 </file>
 
-<file path=ppt/slides/slide13.xml><?xml version="1.0" encoding="utf-8"?>
+<file path=ppt/slides/slide12.xml><?xml version="1.0" encoding="utf-8"?>
 <p:sld xmlns:a="http://schemas.openxmlformats.org/drawingml/2006/main" xmlns:r="http://schemas.openxmlformats.org/officeDocument/2006/relationships" xmlns:p="http://schemas.openxmlformats.org/presentationml/2006/main">
   <p:cSld>
     <p:spTree>
@@ -11403,7 +11274,7 @@
 </p:sld>
 </file>
 
-<file path=ppt/slides/slide14.xml><?xml version="1.0" encoding="utf-8"?>
+<file path=ppt/slides/slide13.xml><?xml version="1.0" encoding="utf-8"?>
 <p:sld xmlns:a="http://schemas.openxmlformats.org/drawingml/2006/main" xmlns:r="http://schemas.openxmlformats.org/officeDocument/2006/relationships" xmlns:p="http://schemas.openxmlformats.org/presentationml/2006/main">
   <p:cSld>
     <p:spTree>
@@ -11463,7 +11334,7 @@
 </p:sld>
 </file>
 
-<file path=ppt/slides/slide15.xml><?xml version="1.0" encoding="utf-8"?>
+<file path=ppt/slides/slide14.xml><?xml version="1.0" encoding="utf-8"?>
 <p:sld xmlns:a="http://schemas.openxmlformats.org/drawingml/2006/main" xmlns:r="http://schemas.openxmlformats.org/officeDocument/2006/relationships" xmlns:p="http://schemas.openxmlformats.org/presentationml/2006/main">
   <p:cSld>
     <p:spTree>
@@ -11523,7 +11394,7 @@
 </p:sld>
 </file>
 
-<file path=ppt/slides/slide16.xml><?xml version="1.0" encoding="utf-8"?>
+<file path=ppt/slides/slide15.xml><?xml version="1.0" encoding="utf-8"?>
 <p:sld xmlns:a="http://schemas.openxmlformats.org/drawingml/2006/main" xmlns:r="http://schemas.openxmlformats.org/officeDocument/2006/relationships" xmlns:p="http://schemas.openxmlformats.org/presentationml/2006/main">
   <p:cSld>
     <p:spTree>
@@ -11583,7 +11454,7 @@
 </p:sld>
 </file>
 
-<file path=ppt/slides/slide17.xml><?xml version="1.0" encoding="utf-8"?>
+<file path=ppt/slides/slide16.xml><?xml version="1.0" encoding="utf-8"?>
 <p:sld xmlns:a="http://schemas.openxmlformats.org/drawingml/2006/main" xmlns:r="http://schemas.openxmlformats.org/officeDocument/2006/relationships" xmlns:p="http://schemas.openxmlformats.org/presentationml/2006/main">
   <p:cSld>
     <p:spTree>
@@ -11643,7 +11514,7 @@
 </p:sld>
 </file>
 
-<file path=ppt/slides/slide18.xml><?xml version="1.0" encoding="utf-8"?>
+<file path=ppt/slides/slide17.xml><?xml version="1.0" encoding="utf-8"?>
 <p:sld xmlns:a="http://schemas.openxmlformats.org/drawingml/2006/main" xmlns:r="http://schemas.openxmlformats.org/officeDocument/2006/relationships" xmlns:p="http://schemas.openxmlformats.org/presentationml/2006/main">
   <p:cSld>
     <p:spTree>
@@ -11975,24 +11846,38 @@
         <p:spPr>
           <a:xfrm>
             <a:off x="838200" y="1825625"/>
-            <a:ext cx="5809916" cy="3629444"/>
+            <a:ext cx="5809916" cy="4184406"/>
           </a:xfrm>
         </p:spPr>
         <p:txBody>
           <a:bodyPr vert="horz" lIns="91440" tIns="45720" rIns="91440" bIns="45720" rtlCol="0" anchor="t">
-            <a:normAutofit lnSpcReduction="10000"/>
+            <a:normAutofit fontScale="92500" lnSpcReduction="20000"/>
           </a:bodyPr>
           <a:lstStyle/>
           <a:p>
             <a:r>
-              <a:rPr lang="en-US" dirty="0">
+              <a:rPr lang="en-GB" dirty="0">
                 <a:cs typeface="Calibri"/>
               </a:rPr>
-              <a:t>Service for calendar apps</a:t>
+              <a:t>APIs provided by the AOSP</a:t>
+            </a:r>
+          </a:p>
+          <a:p>
+            <a:r>
+              <a:rPr lang="en-GB" dirty="0">
+                <a:cs typeface="Calibri"/>
+              </a:rPr>
+              <a:t>It manages and interacts with calendar data</a:t>
             </a:r>
           </a:p>
           <a:p>
             <a:pPr lvl="1"/>
+            <a:r>
+              <a:rPr lang="en-GB" dirty="0">
+                <a:cs typeface="Calibri"/>
+              </a:rPr>
+              <a:t>through Calendar Provider </a:t>
+            </a:r>
             <a:r>
               <a:rPr lang="en-US" dirty="0" err="1">
                 <a:solidFill>
@@ -12011,70 +11896,39 @@
           </a:p>
           <a:p>
             <a:r>
-              <a:rPr lang="en-US" dirty="0">
+              <a:rPr lang="en-GB" dirty="0">
                 <a:cs typeface="Calibri"/>
               </a:rPr>
-              <a:t>Calendar is a tool to keep track of:</a:t>
-            </a:r>
-          </a:p>
-          <a:p>
-            <a:pPr lvl="1" indent="0"/>
-            <a:r>
-              <a:rPr lang="en-US" dirty="0">
+              <a:t>Services features </a:t>
+            </a:r>
+          </a:p>
+          <a:p>
+            <a:pPr lvl="1"/>
+            <a:r>
+              <a:rPr lang="en-GB" dirty="0">
                 <a:cs typeface="Calibri"/>
               </a:rPr>
-              <a:t> Appointments</a:t>
-            </a:r>
-          </a:p>
-          <a:p>
-            <a:pPr lvl="1" indent="0"/>
-            <a:r>
-              <a:rPr lang="en-US" dirty="0">
+              <a:t>allow applications and sync adapters to access, modify, and synchronize calendar events, reminders, and other related data on a user's device</a:t>
+            </a:r>
+          </a:p>
+          <a:p>
+            <a:r>
+              <a:rPr lang="en-GB" dirty="0">
                 <a:cs typeface="Calibri"/>
               </a:rPr>
-              <a:t> Events</a:t>
-            </a:r>
-          </a:p>
-          <a:p>
-            <a:pPr lvl="1" indent="0"/>
-            <a:r>
-              <a:rPr lang="en-US" dirty="0">
+              <a:t>Pre-installed Calendar apps use these services</a:t>
+            </a:r>
+          </a:p>
+          <a:p>
+            <a:pPr lvl="1"/>
+            <a:r>
+              <a:rPr lang="en-GB" dirty="0">
                 <a:cs typeface="Calibri"/>
               </a:rPr>
-              <a:t> Birthdays</a:t>
-            </a:r>
-          </a:p>
-          <a:p>
-            <a:r>
-              <a:rPr lang="en-US" dirty="0">
-                <a:cs typeface="Calibri"/>
-              </a:rPr>
-              <a:t>Evidence types: </a:t>
-            </a:r>
-          </a:p>
-          <a:p>
-            <a:pPr lvl="1" indent="0"/>
-            <a:r>
-              <a:rPr lang="en-US" dirty="0">
-                <a:cs typeface="Calibri"/>
-              </a:rPr>
-              <a:t> Events</a:t>
-            </a:r>
-          </a:p>
-          <a:p>
-            <a:pPr lvl="1" indent="0"/>
-            <a:r>
-              <a:rPr lang="en-US" dirty="0">
-                <a:cs typeface="Calibri"/>
-              </a:rPr>
-              <a:t> Reminders</a:t>
-            </a:r>
-            <a:endParaRPr lang="en-US" dirty="0"/>
-          </a:p>
-          <a:p>
-            <a:pPr lvl="1" indent="0">
-              <a:buNone/>
-            </a:pPr>
+              <a:t>Google Calendar or Samsung Calendar</a:t>
+            </a:r>
+          </a:p>
+          <a:p>
             <a:endParaRPr lang="en-US" dirty="0">
               <a:cs typeface="Calibri"/>
             </a:endParaRPr>
@@ -12229,12 +12083,12 @@
           <a:lstStyle/>
           <a:p>
             <a:r>
-              <a:rPr lang="en-US">
+              <a:rPr lang="en-US" dirty="0">
                 <a:cs typeface="Calibri Light"/>
               </a:rPr>
-              <a:t>Why it's important to investigate calendar evidence?</a:t>
-            </a:r>
-            <a:endParaRPr lang="en-US"/>
+              <a:t>Evidence extracted from calendar services</a:t>
+            </a:r>
+            <a:endParaRPr lang="en-US" dirty="0"/>
           </a:p>
         </p:txBody>
       </p:sp>
@@ -12254,7 +12108,12 @@
             <p:ph idx="1"/>
           </p:nvPr>
         </p:nvSpPr>
-        <p:spPr/>
+        <p:spPr>
+          <a:xfrm>
+            <a:off x="838200" y="1825625"/>
+            <a:ext cx="10515600" cy="2347790"/>
+          </a:xfrm>
+        </p:spPr>
         <p:txBody>
           <a:bodyPr vert="horz" lIns="91440" tIns="45720" rIns="91440" bIns="45720" rtlCol="0" anchor="t">
             <a:normAutofit/>
@@ -12265,28 +12124,10 @@
               <a:rPr lang="en-US" dirty="0">
                 <a:cs typeface="Calibri"/>
               </a:rPr>
-              <a:t>Calendar saves the information about the appointments, events etc.</a:t>
-            </a:r>
-          </a:p>
-          <a:p>
-            <a:r>
-              <a:rPr lang="en-US" dirty="0">
-                <a:cs typeface="Calibri"/>
-              </a:rPr>
-              <a:t>It can give the information about:</a:t>
-            </a:r>
-          </a:p>
-          <a:p>
-            <a:pPr lvl="1"/>
-            <a:r>
-              <a:rPr lang="en-US" dirty="0">
-                <a:cs typeface="Calibri"/>
-              </a:rPr>
               <a:t>Date/time of appointments</a:t>
             </a:r>
           </a:p>
           <a:p>
-            <a:pPr lvl="1"/>
             <a:r>
               <a:rPr lang="en-US" dirty="0">
                 <a:cs typeface="Calibri"/>
@@ -12295,7 +12136,6 @@
             </a:r>
           </a:p>
           <a:p>
-            <a:pPr lvl="1"/>
             <a:r>
               <a:rPr lang="en-US" dirty="0">
                 <a:cs typeface="Calibri"/>
@@ -12304,12 +12144,46 @@
             </a:r>
           </a:p>
           <a:p>
-            <a:pPr lvl="1"/>
             <a:r>
               <a:rPr lang="en-US" dirty="0">
                 <a:cs typeface="Calibri"/>
               </a:rPr>
               <a:t>Attendees </a:t>
+            </a:r>
+          </a:p>
+        </p:txBody>
+      </p:sp>
+      <p:sp>
+        <p:nvSpPr>
+          <p:cNvPr id="5" name="TextBox 4">
+            <a:extLst>
+              <a:ext uri="{FF2B5EF4-FFF2-40B4-BE49-F238E27FC236}">
+                <a16:creationId xmlns:a16="http://schemas.microsoft.com/office/drawing/2014/main" id="{2A32B6A4-B984-E24B-0CDF-F362860B59D8}"/>
+              </a:ext>
+            </a:extLst>
+          </p:cNvPr>
+          <p:cNvSpPr txBox="1"/>
+          <p:nvPr/>
+        </p:nvSpPr>
+        <p:spPr>
+          <a:xfrm>
+            <a:off x="992552" y="4600974"/>
+            <a:ext cx="8346831" cy="369332"/>
+          </a:xfrm>
+          <a:prstGeom prst="rect">
+            <a:avLst/>
+          </a:prstGeom>
+          <a:noFill/>
+        </p:spPr>
+        <p:txBody>
+          <a:bodyPr wrap="square">
+            <a:spAutoFit/>
+          </a:bodyPr>
+          <a:lstStyle/>
+          <a:p>
+            <a:r>
+              <a:rPr lang="en-GB" dirty="0"/>
+              <a:t>Note: In this case, there isn't any data to look at in any of the tables</a:t>
             </a:r>
           </a:p>
         </p:txBody>
@@ -12349,107 +12223,6 @@
           <p:cNvPr id="2" name="Title 1">
             <a:extLst>
               <a:ext uri="{FF2B5EF4-FFF2-40B4-BE49-F238E27FC236}">
-                <a16:creationId xmlns:a16="http://schemas.microsoft.com/office/drawing/2014/main" id="{5E116471-72E1-42BF-B306-575322F79DEF}"/>
-              </a:ext>
-            </a:extLst>
-          </p:cNvPr>
-          <p:cNvSpPr>
-            <a:spLocks noGrp="1"/>
-          </p:cNvSpPr>
-          <p:nvPr>
-            <p:ph type="title"/>
-          </p:nvPr>
-        </p:nvSpPr>
-        <p:spPr/>
-        <p:txBody>
-          <a:bodyPr/>
-          <a:lstStyle/>
-          <a:p>
-            <a:r>
-              <a:rPr lang="en-US">
-                <a:cs typeface="Calibri Light"/>
-              </a:rPr>
-              <a:t>Note</a:t>
-            </a:r>
-            <a:endParaRPr lang="en-US"/>
-          </a:p>
-        </p:txBody>
-      </p:sp>
-      <p:sp>
-        <p:nvSpPr>
-          <p:cNvPr id="3" name="Content Placeholder 2">
-            <a:extLst>
-              <a:ext uri="{FF2B5EF4-FFF2-40B4-BE49-F238E27FC236}">
-                <a16:creationId xmlns:a16="http://schemas.microsoft.com/office/drawing/2014/main" id="{6C7491F3-95DE-4D0C-969D-0E96AB2685CD}"/>
-              </a:ext>
-            </a:extLst>
-          </p:cNvPr>
-          <p:cNvSpPr>
-            <a:spLocks noGrp="1"/>
-          </p:cNvSpPr>
-          <p:nvPr>
-            <p:ph idx="1"/>
-          </p:nvPr>
-        </p:nvSpPr>
-        <p:spPr/>
-        <p:txBody>
-          <a:bodyPr vert="horz" lIns="91440" tIns="45720" rIns="91440" bIns="45720" rtlCol="0" anchor="t">
-            <a:normAutofit/>
-          </a:bodyPr>
-          <a:lstStyle/>
-          <a:p>
-            <a:r>
-              <a:rPr lang="en-US">
-                <a:cs typeface="Calibri"/>
-              </a:rPr>
-              <a:t>Calendar app can be very useful in an investigation but in this case there isn't any data to look at in any of the tables</a:t>
-            </a:r>
-          </a:p>
-          <a:p>
-            <a:r>
-              <a:rPr lang="en-US">
-                <a:cs typeface="Calibri"/>
-              </a:rPr>
-              <a:t>In future, you may use this approach to look through the suspect's calendar data</a:t>
-            </a:r>
-          </a:p>
-        </p:txBody>
-      </p:sp>
-    </p:spTree>
-    <p:extLst>
-      <p:ext uri="{BB962C8B-B14F-4D97-AF65-F5344CB8AC3E}">
-        <p14:creationId xmlns:p14="http://schemas.microsoft.com/office/powerpoint/2010/main" val="1981201839"/>
-      </p:ext>
-    </p:extLst>
-  </p:cSld>
-  <p:clrMapOvr>
-    <a:masterClrMapping/>
-  </p:clrMapOvr>
-</p:sld>
-</file>
-
-<file path=ppt/slides/slide6.xml><?xml version="1.0" encoding="utf-8"?>
-<p:sld xmlns:a="http://schemas.openxmlformats.org/drawingml/2006/main" xmlns:r="http://schemas.openxmlformats.org/officeDocument/2006/relationships" xmlns:p="http://schemas.openxmlformats.org/presentationml/2006/main">
-  <p:cSld>
-    <p:spTree>
-      <p:nvGrpSpPr>
-        <p:cNvPr id="1" name=""/>
-        <p:cNvGrpSpPr/>
-        <p:nvPr/>
-      </p:nvGrpSpPr>
-      <p:grpSpPr>
-        <a:xfrm>
-          <a:off x="0" y="0"/>
-          <a:ext cx="0" cy="0"/>
-          <a:chOff x="0" y="0"/>
-          <a:chExt cx="0" cy="0"/>
-        </a:xfrm>
-      </p:grpSpPr>
-      <p:sp>
-        <p:nvSpPr>
-          <p:cNvPr id="2" name="Title 1">
-            <a:extLst>
-              <a:ext uri="{FF2B5EF4-FFF2-40B4-BE49-F238E27FC236}">
                 <a16:creationId xmlns:a16="http://schemas.microsoft.com/office/drawing/2014/main" id="{CF34116F-509B-4B9B-9679-ECC66D038AA9}"/>
               </a:ext>
             </a:extLst>
@@ -12546,7 +12319,7 @@
 </p:sld>
 </file>
 
-<file path=ppt/slides/slide7.xml><?xml version="1.0" encoding="utf-8"?>
+<file path=ppt/slides/slide6.xml><?xml version="1.0" encoding="utf-8"?>
 <p:sld xmlns:a="http://schemas.openxmlformats.org/drawingml/2006/main" xmlns:r="http://schemas.openxmlformats.org/officeDocument/2006/relationships" xmlns:p="http://schemas.openxmlformats.org/presentationml/2006/main">
   <p:cSld>
     <p:spTree>
@@ -12635,7 +12408,7 @@
 </p:sld>
 </file>
 
-<file path=ppt/slides/slide8.xml><?xml version="1.0" encoding="utf-8"?>
+<file path=ppt/slides/slide7.xml><?xml version="1.0" encoding="utf-8"?>
 <p:sld xmlns:a="http://schemas.openxmlformats.org/drawingml/2006/main" xmlns:r="http://schemas.openxmlformats.org/officeDocument/2006/relationships" xmlns:p="http://schemas.openxmlformats.org/presentationml/2006/main">
   <p:cSld>
     <p:spTree>
@@ -12996,7 +12769,7 @@
 </p:sld>
 </file>
 
-<file path=ppt/slides/slide9.xml><?xml version="1.0" encoding="utf-8"?>
+<file path=ppt/slides/slide8.xml><?xml version="1.0" encoding="utf-8"?>
 <p:sld xmlns:a="http://schemas.openxmlformats.org/drawingml/2006/main" xmlns:r="http://schemas.openxmlformats.org/officeDocument/2006/relationships" xmlns:p="http://schemas.openxmlformats.org/presentationml/2006/main">
   <p:cSld>
     <p:spTree>
@@ -13130,6 +12903,180 @@
     <p:extLst>
       <p:ext uri="{BB962C8B-B14F-4D97-AF65-F5344CB8AC3E}">
         <p14:creationId xmlns:p14="http://schemas.microsoft.com/office/powerpoint/2010/main" val="1839150834"/>
+      </p:ext>
+    </p:extLst>
+  </p:cSld>
+  <p:clrMapOvr>
+    <a:masterClrMapping/>
+  </p:clrMapOvr>
+</p:sld>
+</file>
+
+<file path=ppt/slides/slide9.xml><?xml version="1.0" encoding="utf-8"?>
+<p:sld xmlns:a="http://schemas.openxmlformats.org/drawingml/2006/main" xmlns:r="http://schemas.openxmlformats.org/officeDocument/2006/relationships" xmlns:p="http://schemas.openxmlformats.org/presentationml/2006/main">
+  <p:cSld>
+    <p:spTree>
+      <p:nvGrpSpPr>
+        <p:cNvPr id="1" name=""/>
+        <p:cNvGrpSpPr/>
+        <p:nvPr/>
+      </p:nvGrpSpPr>
+      <p:grpSpPr>
+        <a:xfrm>
+          <a:off x="0" y="0"/>
+          <a:ext cx="0" cy="0"/>
+          <a:chOff x="0" y="0"/>
+          <a:chExt cx="0" cy="0"/>
+        </a:xfrm>
+      </p:grpSpPr>
+      <p:sp>
+        <p:nvSpPr>
+          <p:cNvPr id="2" name="Title 1">
+            <a:extLst>
+              <a:ext uri="{FF2B5EF4-FFF2-40B4-BE49-F238E27FC236}">
+                <a16:creationId xmlns:a16="http://schemas.microsoft.com/office/drawing/2014/main" id="{88A96AAE-54C7-4A67-B297-1D11C1D82726}"/>
+              </a:ext>
+            </a:extLst>
+          </p:cNvPr>
+          <p:cNvSpPr>
+            <a:spLocks noGrp="1"/>
+          </p:cNvSpPr>
+          <p:nvPr>
+            <p:ph type="title"/>
+          </p:nvPr>
+        </p:nvSpPr>
+        <p:spPr/>
+        <p:txBody>
+          <a:bodyPr/>
+          <a:lstStyle/>
+          <a:p>
+            <a:r>
+              <a:rPr lang="en-US" dirty="0" err="1">
+                <a:solidFill>
+                  <a:schemeClr val="accent2"/>
+                </a:solidFill>
+                <a:cs typeface="Calibri Light"/>
+              </a:rPr>
+              <a:t>calendar.db</a:t>
+            </a:r>
+            <a:r>
+              <a:rPr lang="en-US" dirty="0">
+                <a:solidFill>
+                  <a:schemeClr val="accent2"/>
+                </a:solidFill>
+                <a:cs typeface="Calibri Light"/>
+              </a:rPr>
+              <a:t> </a:t>
+            </a:r>
+            <a:r>
+              <a:rPr lang="en-US" dirty="0">
+                <a:cs typeface="Calibri Light"/>
+              </a:rPr>
+              <a:t>location</a:t>
+            </a:r>
+            <a:r>
+              <a:rPr lang="en-US" dirty="0">
+                <a:solidFill>
+                  <a:schemeClr val="accent2"/>
+                </a:solidFill>
+                <a:cs typeface="Calibri Light"/>
+              </a:rPr>
+              <a:t> </a:t>
+            </a:r>
+            <a:endParaRPr lang="en-US" dirty="0">
+              <a:solidFill>
+                <a:schemeClr val="accent2"/>
+              </a:solidFill>
+            </a:endParaRPr>
+          </a:p>
+        </p:txBody>
+      </p:sp>
+      <p:pic>
+        <p:nvPicPr>
+          <p:cNvPr id="5" name="Picture 5" descr="A picture containing logo&#10;&#10;Description automatically generated">
+            <a:extLst>
+              <a:ext uri="{FF2B5EF4-FFF2-40B4-BE49-F238E27FC236}">
+                <a16:creationId xmlns:a16="http://schemas.microsoft.com/office/drawing/2014/main" id="{8AEDF05A-60F2-4524-8451-C5C728E103BB}"/>
+              </a:ext>
+            </a:extLst>
+          </p:cNvPr>
+          <p:cNvPicPr>
+            <a:picLocks noChangeAspect="1"/>
+          </p:cNvPicPr>
+          <p:nvPr/>
+        </p:nvPicPr>
+        <p:blipFill>
+          <a:blip r:embed="rId3"/>
+          <a:stretch>
+            <a:fillRect/>
+          </a:stretch>
+        </p:blipFill>
+        <p:spPr>
+          <a:xfrm>
+            <a:off x="838200" y="2467080"/>
+            <a:ext cx="10233837" cy="2145751"/>
+          </a:xfrm>
+          <a:prstGeom prst="rect">
+            <a:avLst/>
+          </a:prstGeom>
+        </p:spPr>
+      </p:pic>
+      <p:sp>
+        <p:nvSpPr>
+          <p:cNvPr id="6" name="Rectangle 5">
+            <a:extLst>
+              <a:ext uri="{FF2B5EF4-FFF2-40B4-BE49-F238E27FC236}">
+                <a16:creationId xmlns:a16="http://schemas.microsoft.com/office/drawing/2014/main" id="{383E0541-0D55-451D-AAD3-ADD4C9225F75}"/>
+              </a:ext>
+            </a:extLst>
+          </p:cNvPr>
+          <p:cNvSpPr/>
+          <p:nvPr/>
+        </p:nvSpPr>
+        <p:spPr>
+          <a:xfrm>
+            <a:off x="1498442" y="3025069"/>
+            <a:ext cx="9502711" cy="313554"/>
+          </a:xfrm>
+          <a:prstGeom prst="rect">
+            <a:avLst/>
+          </a:prstGeom>
+          <a:noFill/>
+          <a:ln w="28575">
+            <a:solidFill>
+              <a:srgbClr val="FF0000"/>
+            </a:solidFill>
+          </a:ln>
+        </p:spPr>
+        <p:style>
+          <a:lnRef idx="2">
+            <a:schemeClr val="accent1">
+              <a:shade val="50000"/>
+            </a:schemeClr>
+          </a:lnRef>
+          <a:fillRef idx="1">
+            <a:schemeClr val="accent1"/>
+          </a:fillRef>
+          <a:effectRef idx="0">
+            <a:schemeClr val="accent1"/>
+          </a:effectRef>
+          <a:fontRef idx="minor">
+            <a:schemeClr val="lt1"/>
+          </a:fontRef>
+        </p:style>
+        <p:txBody>
+          <a:bodyPr rtlCol="0" anchor="ctr"/>
+          <a:lstStyle/>
+          <a:p>
+            <a:pPr algn="ctr"/>
+            <a:endParaRPr lang="en-US"/>
+          </a:p>
+        </p:txBody>
+      </p:sp>
+    </p:spTree>
+    <p:extLst>
+      <p:ext uri="{BB962C8B-B14F-4D97-AF65-F5344CB8AC3E}">
+        <p14:creationId xmlns:p14="http://schemas.microsoft.com/office/powerpoint/2010/main" val="46822973"/>
       </p:ext>
     </p:extLst>
   </p:cSld>

</xml_diff>